<commit_message>
Quick Merge && Beginning of pres
</commit_message>
<xml_diff>
--- a/src/main/resources/pres/BENZA_FORNALI-sorts.pptx
+++ b/src/main/resources/pres/BENZA_FORNALI-sorts.pptx
@@ -5,24 +5,31 @@
     <p:sldMasterId id="2147483750" r:id="rId1"/>
   </p:sldMasterIdLst>
   <p:sldIdLst>
-    <p:sldId id="269" r:id="rId2"/>
-    <p:sldId id="256" r:id="rId3"/>
-    <p:sldId id="262" r:id="rId4"/>
-    <p:sldId id="263" r:id="rId5"/>
-    <p:sldId id="257" r:id="rId6"/>
-    <p:sldId id="270" r:id="rId7"/>
-    <p:sldId id="271" r:id="rId8"/>
-    <p:sldId id="272" r:id="rId9"/>
-    <p:sldId id="273" r:id="rId10"/>
-    <p:sldId id="264" r:id="rId11"/>
-    <p:sldId id="258" r:id="rId12"/>
-    <p:sldId id="265" r:id="rId13"/>
-    <p:sldId id="259" r:id="rId14"/>
-    <p:sldId id="266" r:id="rId15"/>
-    <p:sldId id="260" r:id="rId16"/>
-    <p:sldId id="267" r:id="rId17"/>
-    <p:sldId id="261" r:id="rId18"/>
-    <p:sldId id="268" r:id="rId19"/>
+    <p:sldId id="275" r:id="rId2"/>
+    <p:sldId id="276" r:id="rId3"/>
+    <p:sldId id="277" r:id="rId4"/>
+    <p:sldId id="278" r:id="rId5"/>
+    <p:sldId id="279" r:id="rId6"/>
+    <p:sldId id="280" r:id="rId7"/>
+    <p:sldId id="269" r:id="rId8"/>
+    <p:sldId id="256" r:id="rId9"/>
+    <p:sldId id="274" r:id="rId10"/>
+    <p:sldId id="262" r:id="rId11"/>
+    <p:sldId id="263" r:id="rId12"/>
+    <p:sldId id="257" r:id="rId13"/>
+    <p:sldId id="270" r:id="rId14"/>
+    <p:sldId id="271" r:id="rId15"/>
+    <p:sldId id="272" r:id="rId16"/>
+    <p:sldId id="273" r:id="rId17"/>
+    <p:sldId id="264" r:id="rId18"/>
+    <p:sldId id="258" r:id="rId19"/>
+    <p:sldId id="265" r:id="rId20"/>
+    <p:sldId id="259" r:id="rId21"/>
+    <p:sldId id="266" r:id="rId22"/>
+    <p:sldId id="260" r:id="rId23"/>
+    <p:sldId id="267" r:id="rId24"/>
+    <p:sldId id="261" r:id="rId25"/>
+    <p:sldId id="268" r:id="rId26"/>
   </p:sldIdLst>
   <p:sldSz cx="12192000" cy="6858000"/>
   <p:notesSz cx="6858000" cy="9144000"/>
@@ -121,6 +128,11 @@
       </a:defRPr>
     </a:lvl9pPr>
   </p:defaultTextStyle>
+  <p:extLst>
+    <p:ext uri="{EFAFB233-063F-42B5-8137-9DF3F51BA10A}">
+      <p15:sldGuideLst xmlns:p15="http://schemas.microsoft.com/office/powerpoint/2012/main"/>
+    </p:ext>
+  </p:extLst>
 </p:presentation>
 </file>
 
@@ -255,7 +267,7 @@
           <a:p>
             <a:fld id="{390A269A-8C50-429B-9331-2C70684C9FF3}" type="datetimeFigureOut">
               <a:rPr lang="fr-FR" smtClean="0"/>
-              <a:t>04/10/2018</a:t>
+              <a:t>08/10/2018</a:t>
             </a:fld>
             <a:endParaRPr lang="fr-FR"/>
           </a:p>
@@ -425,7 +437,7 @@
           <a:p>
             <a:fld id="{390A269A-8C50-429B-9331-2C70684C9FF3}" type="datetimeFigureOut">
               <a:rPr lang="fr-FR" smtClean="0"/>
-              <a:t>04/10/2018</a:t>
+              <a:t>08/10/2018</a:t>
             </a:fld>
             <a:endParaRPr lang="fr-FR"/>
           </a:p>
@@ -605,7 +617,7 @@
           <a:p>
             <a:fld id="{390A269A-8C50-429B-9331-2C70684C9FF3}" type="datetimeFigureOut">
               <a:rPr lang="fr-FR" smtClean="0"/>
-              <a:t>04/10/2018</a:t>
+              <a:t>08/10/2018</a:t>
             </a:fld>
             <a:endParaRPr lang="fr-FR"/>
           </a:p>
@@ -775,7 +787,7 @@
           <a:p>
             <a:fld id="{390A269A-8C50-429B-9331-2C70684C9FF3}" type="datetimeFigureOut">
               <a:rPr lang="fr-FR" smtClean="0"/>
-              <a:t>04/10/2018</a:t>
+              <a:t>08/10/2018</a:t>
             </a:fld>
             <a:endParaRPr lang="fr-FR"/>
           </a:p>
@@ -1021,7 +1033,7 @@
           <a:p>
             <a:fld id="{390A269A-8C50-429B-9331-2C70684C9FF3}" type="datetimeFigureOut">
               <a:rPr lang="fr-FR" smtClean="0"/>
-              <a:t>04/10/2018</a:t>
+              <a:t>08/10/2018</a:t>
             </a:fld>
             <a:endParaRPr lang="fr-FR"/>
           </a:p>
@@ -1253,7 +1265,7 @@
           <a:p>
             <a:fld id="{390A269A-8C50-429B-9331-2C70684C9FF3}" type="datetimeFigureOut">
               <a:rPr lang="fr-FR" smtClean="0"/>
-              <a:t>04/10/2018</a:t>
+              <a:t>08/10/2018</a:t>
             </a:fld>
             <a:endParaRPr lang="fr-FR"/>
           </a:p>
@@ -1620,7 +1632,7 @@
           <a:p>
             <a:fld id="{390A269A-8C50-429B-9331-2C70684C9FF3}" type="datetimeFigureOut">
               <a:rPr lang="fr-FR" smtClean="0"/>
-              <a:t>04/10/2018</a:t>
+              <a:t>08/10/2018</a:t>
             </a:fld>
             <a:endParaRPr lang="fr-FR"/>
           </a:p>
@@ -1738,7 +1750,7 @@
           <a:p>
             <a:fld id="{390A269A-8C50-429B-9331-2C70684C9FF3}" type="datetimeFigureOut">
               <a:rPr lang="fr-FR" smtClean="0"/>
-              <a:t>04/10/2018</a:t>
+              <a:t>08/10/2018</a:t>
             </a:fld>
             <a:endParaRPr lang="fr-FR"/>
           </a:p>
@@ -1833,7 +1845,7 @@
           <a:p>
             <a:fld id="{390A269A-8C50-429B-9331-2C70684C9FF3}" type="datetimeFigureOut">
               <a:rPr lang="fr-FR" smtClean="0"/>
-              <a:t>04/10/2018</a:t>
+              <a:t>08/10/2018</a:t>
             </a:fld>
             <a:endParaRPr lang="fr-FR"/>
           </a:p>
@@ -2110,7 +2122,7 @@
           <a:p>
             <a:fld id="{390A269A-8C50-429B-9331-2C70684C9FF3}" type="datetimeFigureOut">
               <a:rPr lang="fr-FR" smtClean="0"/>
-              <a:t>04/10/2018</a:t>
+              <a:t>08/10/2018</a:t>
             </a:fld>
             <a:endParaRPr lang="fr-FR"/>
           </a:p>
@@ -2363,7 +2375,7 @@
           <a:p>
             <a:fld id="{390A269A-8C50-429B-9331-2C70684C9FF3}" type="datetimeFigureOut">
               <a:rPr lang="fr-FR" smtClean="0"/>
-              <a:t>04/10/2018</a:t>
+              <a:t>08/10/2018</a:t>
             </a:fld>
             <a:endParaRPr lang="fr-FR"/>
           </a:p>
@@ -2576,7 +2588,7 @@
           <a:p>
             <a:fld id="{390A269A-8C50-429B-9331-2C70684C9FF3}" type="datetimeFigureOut">
               <a:rPr lang="fr-FR" smtClean="0"/>
-              <a:t>04/10/2018</a:t>
+              <a:t>08/10/2018</a:t>
             </a:fld>
             <a:endParaRPr lang="fr-FR"/>
           </a:p>
@@ -2965,7 +2977,7 @@
 </file>
 
 <file path=ppt/slides/slide1.xml><?xml version="1.0" encoding="utf-8"?>
-<p:sld xmlns:a="http://schemas.openxmlformats.org/drawingml/2006/main" xmlns:r="http://schemas.openxmlformats.org/officeDocument/2006/relationships" xmlns:p="http://schemas.openxmlformats.org/presentationml/2006/main" show="0">
+<p:sld xmlns:a="http://schemas.openxmlformats.org/drawingml/2006/main" xmlns:r="http://schemas.openxmlformats.org/officeDocument/2006/relationships" xmlns:p="http://schemas.openxmlformats.org/presentationml/2006/main">
   <p:cSld>
     <p:spTree>
       <p:nvGrpSpPr>
@@ -2981,6 +2993,35 @@
           <a:chExt cx="0" cy="0"/>
         </a:xfrm>
       </p:grpSpPr>
+      <p:pic>
+        <p:nvPicPr>
+          <p:cNvPr id="6" name="Content Placeholder 5"/>
+          <p:cNvPicPr>
+            <a:picLocks noGrp="1" noChangeAspect="1"/>
+          </p:cNvPicPr>
+          <p:nvPr>
+            <p:ph idx="1"/>
+          </p:nvPr>
+        </p:nvPicPr>
+        <p:blipFill>
+          <a:blip r:embed="rId2" cstate="print">
+            <a:extLst>
+              <a:ext uri="{28A0092B-C50C-407E-A947-70E740481C1C}">
+                <a14:useLocalDpi xmlns:a14="http://schemas.microsoft.com/office/drawing/2010/main" val="0"/>
+              </a:ext>
+            </a:extLst>
+          </a:blip>
+          <a:stretch>
+            <a:fillRect/>
+          </a:stretch>
+        </p:blipFill>
+        <p:spPr>
+          <a:xfrm>
+            <a:off x="0" y="0"/>
+            <a:ext cx="12192000" cy="6858000"/>
+          </a:xfrm>
+        </p:spPr>
+      </p:pic>
       <p:sp>
         <p:nvSpPr>
           <p:cNvPr id="2" name="Title 1"/>
@@ -2988,132 +3029,78 @@
             <a:spLocks noGrp="1"/>
           </p:cNvSpPr>
           <p:nvPr>
-            <p:ph type="ctrTitle"/>
-          </p:nvPr>
-        </p:nvSpPr>
-        <p:spPr>
-          <a:xfrm>
-            <a:off x="1524000" y="1122362"/>
-            <a:ext cx="9144000" cy="3280079"/>
+            <p:ph type="title"/>
+          </p:nvPr>
+        </p:nvSpPr>
+        <p:spPr>
+          <a:xfrm>
+            <a:off x="-1608275" y="2178476"/>
+            <a:ext cx="10515600" cy="1325563"/>
           </a:xfrm>
         </p:spPr>
         <p:txBody>
           <a:bodyPr>
-            <a:noAutofit/>
+            <a:normAutofit fontScale="90000"/>
           </a:bodyPr>
           <a:lstStyle/>
           <a:p>
-            <a:pPr algn="l"/>
-            <a:r>
-              <a:rPr lang="fr-FR" sz="1800" dirty="0" smtClean="0"/>
-              <a:t/>
+            <a:pPr algn="ctr"/>
+            <a:r>
+              <a:rPr lang="en-US" sz="6000" b="1" dirty="0" smtClean="0"/>
+              <a:t>Sorts competition</a:t>
             </a:r>
             <a:br>
-              <a:rPr lang="fr-FR" sz="1800" dirty="0" smtClean="0"/>
+              <a:rPr lang="en-US" sz="6000" b="1" dirty="0" smtClean="0"/>
             </a:br>
-            <a:r>
-              <a:rPr lang="fr-FR" sz="1800" dirty="0" smtClean="0"/>
-              <a:t/>
-            </a:r>
-            <a:br>
-              <a:rPr lang="fr-FR" sz="1800" dirty="0" smtClean="0"/>
-            </a:br>
-            <a:r>
-              <a:rPr lang="fr-FR" sz="1800" dirty="0" smtClean="0"/>
-              <a:t>- Est-ce que je vois la différence entre tris optimaux (fusion, tas) et non optimaux (insertion, tri rapide dans certains cas) ?</a:t>
-            </a:r>
-            <a:br>
-              <a:rPr lang="fr-FR" sz="1800" dirty="0" smtClean="0"/>
-            </a:br>
-            <a:r>
-              <a:rPr lang="fr-FR" sz="1800" dirty="0" smtClean="0"/>
-              <a:t/>
-            </a:r>
-            <a:br>
-              <a:rPr lang="fr-FR" sz="1800" dirty="0" smtClean="0"/>
-            </a:br>
-            <a:r>
-              <a:rPr lang="fr-FR" sz="1800" dirty="0" smtClean="0"/>
-              <a:t>- Comparaison des tris optimaux, quel est le meilleur pour mon langage ?</a:t>
-            </a:r>
-            <a:br>
-              <a:rPr lang="fr-FR" sz="1800" dirty="0" smtClean="0"/>
-            </a:br>
-            <a:r>
-              <a:rPr lang="fr-FR" sz="1800" dirty="0" smtClean="0"/>
-              <a:t/>
-            </a:r>
-            <a:br>
-              <a:rPr lang="fr-FR" sz="1800" dirty="0" smtClean="0"/>
-            </a:br>
-            <a:r>
-              <a:rPr lang="fr-FR" sz="1800" dirty="0" smtClean="0"/>
-              <a:t>- Comparaisons des méthodes de choix de pivot sur le tri rapide</a:t>
-            </a:r>
-            <a:br>
-              <a:rPr lang="fr-FR" sz="1800" dirty="0" smtClean="0"/>
-            </a:br>
-            <a:r>
-              <a:rPr lang="fr-FR" sz="1800" dirty="0" smtClean="0"/>
-              <a:t/>
-            </a:r>
-            <a:br>
-              <a:rPr lang="fr-FR" sz="1800" dirty="0" smtClean="0"/>
-            </a:br>
-            <a:r>
-              <a:rPr lang="fr-FR" sz="1800" dirty="0" smtClean="0"/>
-              <a:t>- Comparaisons des valeurs de seuil pour le tri rapide</a:t>
-            </a:r>
-            <a:br>
-              <a:rPr lang="fr-FR" sz="1800" dirty="0" smtClean="0"/>
-            </a:br>
-            <a:r>
-              <a:rPr lang="fr-FR" sz="1800" dirty="0" smtClean="0"/>
-              <a:t/>
-            </a:r>
-            <a:br>
-              <a:rPr lang="fr-FR" sz="1800" dirty="0" smtClean="0"/>
-            </a:br>
-            <a:r>
-              <a:rPr lang="fr-FR" sz="1800" dirty="0" smtClean="0"/>
-              <a:t>- Autres résultats intéressants mis en lumière par le travail du binôme</a:t>
-            </a:r>
-            <a:br>
-              <a:rPr lang="fr-FR" sz="1800" dirty="0" smtClean="0"/>
-            </a:br>
-            <a:r>
-              <a:rPr lang="fr-FR" sz="1800" dirty="0" smtClean="0"/>
-              <a:t/>
-            </a:r>
-            <a:br>
-              <a:rPr lang="fr-FR" sz="1800" dirty="0" smtClean="0"/>
-            </a:br>
-            <a:r>
-              <a:rPr lang="fr-FR" sz="1800" dirty="0" smtClean="0"/>
-              <a:t>- Analyse et conclusion. (Qu'est-ce que j'ai appris ?) (modifié)</a:t>
-            </a:r>
-            <a:endParaRPr lang="fr-FR" sz="1800" dirty="0"/>
+            <a:endParaRPr lang="fr-FR" sz="6000" b="1" dirty="0"/>
+          </a:p>
+        </p:txBody>
+      </p:sp>
+      <p:sp>
+        <p:nvSpPr>
+          <p:cNvPr id="7" name="Rectangle 6"/>
+          <p:cNvSpPr/>
+          <p:nvPr/>
+        </p:nvSpPr>
+        <p:spPr>
+          <a:xfrm>
+            <a:off x="1212136" y="2975709"/>
+            <a:ext cx="6096000" cy="369332"/>
+          </a:xfrm>
+          <a:prstGeom prst="rect">
+            <a:avLst/>
+          </a:prstGeom>
+        </p:spPr>
+        <p:txBody>
+          <a:bodyPr>
+            <a:spAutoFit/>
+          </a:bodyPr>
+          <a:lstStyle/>
+          <a:p>
+            <a:r>
+              <a:rPr lang="en-US" dirty="0" smtClean="0">
+                <a:solidFill>
+                  <a:schemeClr val="tx1">
+                    <a:lumMod val="65000"/>
+                    <a:lumOff val="35000"/>
+                  </a:schemeClr>
+                </a:solidFill>
+              </a:rPr>
+              <a:t>BENZA Amandine – FORNALI Damien</a:t>
+            </a:r>
           </a:p>
         </p:txBody>
       </p:sp>
     </p:spTree>
     <p:extLst>
       <p:ext uri="{BB962C8B-B14F-4D97-AF65-F5344CB8AC3E}">
-        <p14:creationId xmlns:p14="http://schemas.microsoft.com/office/powerpoint/2010/main" val="2584005190"/>
+        <p14:creationId xmlns:p14="http://schemas.microsoft.com/office/powerpoint/2010/main" val="13195053"/>
       </p:ext>
     </p:extLst>
   </p:cSld>
   <p:clrMapOvr>
     <a:masterClrMapping/>
   </p:clrMapOvr>
-  <mc:AlternateContent xmlns:mc="http://schemas.openxmlformats.org/markup-compatibility/2006">
-    <mc:Choice xmlns:p14="http://schemas.microsoft.com/office/powerpoint/2010/main" Requires="p14">
-      <p:transition spd="slow" p14:dur="2000"/>
-    </mc:Choice>
-    <mc:Fallback>
-      <p:transition spd="slow"/>
-    </mc:Fallback>
-  </mc:AlternateContent>
   <p:timing>
     <p:tnLst>
       <p:par>
@@ -3256,7 +3243,7 @@
                   <a:schemeClr val="bg1"/>
                 </a:solidFill>
               </a:rPr>
-              <a:t>Best optimum sort - Reversed</a:t>
+              <a:t>Optimum vs non-optimum sorts</a:t>
             </a:r>
             <a:endParaRPr lang="fr-FR" sz="4000" b="1" dirty="0">
               <a:solidFill>
@@ -3269,7 +3256,7 @@
     </p:spTree>
     <p:extLst>
       <p:ext uri="{BB962C8B-B14F-4D97-AF65-F5344CB8AC3E}">
-        <p14:creationId xmlns:p14="http://schemas.microsoft.com/office/powerpoint/2010/main" val="2187059137"/>
+        <p14:creationId xmlns:p14="http://schemas.microsoft.com/office/powerpoint/2010/main" val="3323054275"/>
       </p:ext>
     </p:extLst>
   </p:cSld>
@@ -3418,7 +3405,7 @@
                   <a:schemeClr val="bg1"/>
                 </a:solidFill>
               </a:rPr>
-              <a:t>Quick sort pivots</a:t>
+              <a:t>Optimum vs non-optimum sorts</a:t>
             </a:r>
             <a:endParaRPr lang="fr-FR" sz="4000" b="1" dirty="0">
               <a:solidFill>
@@ -3431,7 +3418,7 @@
     </p:spTree>
     <p:extLst>
       <p:ext uri="{BB962C8B-B14F-4D97-AF65-F5344CB8AC3E}">
-        <p14:creationId xmlns:p14="http://schemas.microsoft.com/office/powerpoint/2010/main" val="15967497"/>
+        <p14:creationId xmlns:p14="http://schemas.microsoft.com/office/powerpoint/2010/main" val="760186330"/>
       </p:ext>
     </p:extLst>
   </p:cSld>
@@ -3580,7 +3567,7 @@
                   <a:schemeClr val="bg1"/>
                 </a:solidFill>
               </a:rPr>
-              <a:t>Quick sort pivots</a:t>
+              <a:t>Best optimum sort - Random</a:t>
             </a:r>
             <a:endParaRPr lang="fr-FR" sz="4000" b="1" dirty="0">
               <a:solidFill>
@@ -3590,16 +3577,54 @@
           </a:p>
         </p:txBody>
       </p:sp>
+      <p:pic>
+        <p:nvPicPr>
+          <p:cNvPr id="8" name="Picture 7"/>
+          <p:cNvPicPr>
+            <a:picLocks noChangeAspect="1"/>
+          </p:cNvPicPr>
+          <p:nvPr/>
+        </p:nvPicPr>
+        <p:blipFill>
+          <a:blip r:embed="rId3" cstate="print">
+            <a:extLst>
+              <a:ext uri="{28A0092B-C50C-407E-A947-70E740481C1C}">
+                <a14:useLocalDpi xmlns:a14="http://schemas.microsoft.com/office/drawing/2010/main" val="0"/>
+              </a:ext>
+            </a:extLst>
+          </a:blip>
+          <a:stretch>
+            <a:fillRect/>
+          </a:stretch>
+        </p:blipFill>
+        <p:spPr>
+          <a:xfrm>
+            <a:off x="1027086" y="1277620"/>
+            <a:ext cx="9963528" cy="5307127"/>
+          </a:xfrm>
+          <a:prstGeom prst="rect">
+            <a:avLst/>
+          </a:prstGeom>
+        </p:spPr>
+      </p:pic>
     </p:spTree>
     <p:extLst>
       <p:ext uri="{BB962C8B-B14F-4D97-AF65-F5344CB8AC3E}">
-        <p14:creationId xmlns:p14="http://schemas.microsoft.com/office/powerpoint/2010/main" val="3711881733"/>
+        <p14:creationId xmlns:p14="http://schemas.microsoft.com/office/powerpoint/2010/main" val="348667985"/>
       </p:ext>
     </p:extLst>
   </p:cSld>
   <p:clrMapOvr>
     <a:masterClrMapping/>
   </p:clrMapOvr>
+  <mc:AlternateContent xmlns:mc="http://schemas.openxmlformats.org/markup-compatibility/2006" xmlns:p14="http://schemas.microsoft.com/office/powerpoint/2010/main">
+    <mc:Choice Requires="p14">
+      <p:transition spd="slow" p14:dur="2000"/>
+    </mc:Choice>
+    <mc:Fallback xmlns="">
+      <p:transition spd="slow"/>
+    </mc:Fallback>
+  </mc:AlternateContent>
   <p:timing>
     <p:tnLst>
       <p:par>
@@ -3611,7 +3636,7 @@
 </file>
 
 <file path=ppt/slides/slide13.xml><?xml version="1.0" encoding="utf-8"?>
-<p:sld xmlns:a="http://schemas.openxmlformats.org/drawingml/2006/main" xmlns:r="http://schemas.openxmlformats.org/officeDocument/2006/relationships" xmlns:p="http://schemas.openxmlformats.org/presentationml/2006/main">
+<p:sld xmlns:a="http://schemas.openxmlformats.org/drawingml/2006/main" xmlns:r="http://schemas.openxmlformats.org/officeDocument/2006/relationships" xmlns:p="http://schemas.openxmlformats.org/presentationml/2006/main" show="0">
   <p:cSld>
     <p:spTree>
       <p:nvGrpSpPr>
@@ -3742,7 +3767,7 @@
                   <a:schemeClr val="bg1"/>
                 </a:solidFill>
               </a:rPr>
-              <a:t>Quick sort threshold values</a:t>
+              <a:t>Best optimum sort - Random</a:t>
             </a:r>
             <a:endParaRPr lang="fr-FR" sz="4000" b="1" dirty="0">
               <a:solidFill>
@@ -3752,16 +3777,54 @@
           </a:p>
         </p:txBody>
       </p:sp>
+      <p:pic>
+        <p:nvPicPr>
+          <p:cNvPr id="5" name="Picture 4"/>
+          <p:cNvPicPr>
+            <a:picLocks noChangeAspect="1"/>
+          </p:cNvPicPr>
+          <p:nvPr/>
+        </p:nvPicPr>
+        <p:blipFill>
+          <a:blip r:embed="rId3" cstate="print">
+            <a:extLst>
+              <a:ext uri="{28A0092B-C50C-407E-A947-70E740481C1C}">
+                <a14:useLocalDpi xmlns:a14="http://schemas.microsoft.com/office/drawing/2010/main" val="0"/>
+              </a:ext>
+            </a:extLst>
+          </a:blip>
+          <a:stretch>
+            <a:fillRect/>
+          </a:stretch>
+        </p:blipFill>
+        <p:spPr>
+          <a:xfrm>
+            <a:off x="1043939" y="1270000"/>
+            <a:ext cx="9964800" cy="5307551"/>
+          </a:xfrm>
+          <a:prstGeom prst="rect">
+            <a:avLst/>
+          </a:prstGeom>
+        </p:spPr>
+      </p:pic>
     </p:spTree>
     <p:extLst>
       <p:ext uri="{BB962C8B-B14F-4D97-AF65-F5344CB8AC3E}">
-        <p14:creationId xmlns:p14="http://schemas.microsoft.com/office/powerpoint/2010/main" val="1777590545"/>
+        <p14:creationId xmlns:p14="http://schemas.microsoft.com/office/powerpoint/2010/main" val="2071232805"/>
       </p:ext>
     </p:extLst>
   </p:cSld>
   <p:clrMapOvr>
     <a:masterClrMapping/>
   </p:clrMapOvr>
+  <mc:AlternateContent xmlns:mc="http://schemas.openxmlformats.org/markup-compatibility/2006" xmlns:p14="http://schemas.microsoft.com/office/powerpoint/2010/main">
+    <mc:Choice Requires="p14">
+      <p:transition spd="slow" p14:dur="2000"/>
+    </mc:Choice>
+    <mc:Fallback xmlns="">
+      <p:transition spd="slow"/>
+    </mc:Fallback>
+  </mc:AlternateContent>
   <p:timing>
     <p:tnLst>
       <p:par>
@@ -3773,7 +3836,7 @@
 </file>
 
 <file path=ppt/slides/slide14.xml><?xml version="1.0" encoding="utf-8"?>
-<p:sld xmlns:a="http://schemas.openxmlformats.org/drawingml/2006/main" xmlns:r="http://schemas.openxmlformats.org/officeDocument/2006/relationships" xmlns:p="http://schemas.openxmlformats.org/presentationml/2006/main">
+<p:sld xmlns:a="http://schemas.openxmlformats.org/drawingml/2006/main" xmlns:r="http://schemas.openxmlformats.org/officeDocument/2006/relationships" xmlns:p="http://schemas.openxmlformats.org/presentationml/2006/main" show="0">
   <p:cSld>
     <p:spTree>
       <p:nvGrpSpPr>
@@ -3904,7 +3967,7 @@
                   <a:schemeClr val="bg1"/>
                 </a:solidFill>
               </a:rPr>
-              <a:t>Quick sort threshold values</a:t>
+              <a:t>Best optimum sort - Random</a:t>
             </a:r>
             <a:endParaRPr lang="fr-FR" sz="4000" b="1" dirty="0">
               <a:solidFill>
@@ -3914,16 +3977,54 @@
           </a:p>
         </p:txBody>
       </p:sp>
+      <p:pic>
+        <p:nvPicPr>
+          <p:cNvPr id="5" name="Picture 4"/>
+          <p:cNvPicPr>
+            <a:picLocks noChangeAspect="1"/>
+          </p:cNvPicPr>
+          <p:nvPr/>
+        </p:nvPicPr>
+        <p:blipFill>
+          <a:blip r:embed="rId3" cstate="print">
+            <a:extLst>
+              <a:ext uri="{28A0092B-C50C-407E-A947-70E740481C1C}">
+                <a14:useLocalDpi xmlns:a14="http://schemas.microsoft.com/office/drawing/2010/main" val="0"/>
+              </a:ext>
+            </a:extLst>
+          </a:blip>
+          <a:stretch>
+            <a:fillRect/>
+          </a:stretch>
+        </p:blipFill>
+        <p:spPr>
+          <a:xfrm>
+            <a:off x="1013460" y="1262380"/>
+            <a:ext cx="9964800" cy="5301835"/>
+          </a:xfrm>
+          <a:prstGeom prst="rect">
+            <a:avLst/>
+          </a:prstGeom>
+        </p:spPr>
+      </p:pic>
     </p:spTree>
     <p:extLst>
       <p:ext uri="{BB962C8B-B14F-4D97-AF65-F5344CB8AC3E}">
-        <p14:creationId xmlns:p14="http://schemas.microsoft.com/office/powerpoint/2010/main" val="4283506139"/>
+        <p14:creationId xmlns:p14="http://schemas.microsoft.com/office/powerpoint/2010/main" val="3112505893"/>
       </p:ext>
     </p:extLst>
   </p:cSld>
   <p:clrMapOvr>
     <a:masterClrMapping/>
   </p:clrMapOvr>
+  <mc:AlternateContent xmlns:mc="http://schemas.openxmlformats.org/markup-compatibility/2006" xmlns:p14="http://schemas.microsoft.com/office/powerpoint/2010/main">
+    <mc:Choice Requires="p14">
+      <p:transition spd="slow" p14:dur="2000"/>
+    </mc:Choice>
+    <mc:Fallback xmlns="">
+      <p:transition spd="slow"/>
+    </mc:Fallback>
+  </mc:AlternateContent>
   <p:timing>
     <p:tnLst>
       <p:par>
@@ -4066,7 +4167,7 @@
                   <a:schemeClr val="bg1"/>
                 </a:solidFill>
               </a:rPr>
-              <a:t>Interesting results</a:t>
+              <a:t>Best optimum sort - Flat</a:t>
             </a:r>
             <a:endParaRPr lang="fr-FR" sz="4000" b="1" dirty="0">
               <a:solidFill>
@@ -4079,7 +4180,7 @@
     </p:spTree>
     <p:extLst>
       <p:ext uri="{BB962C8B-B14F-4D97-AF65-F5344CB8AC3E}">
-        <p14:creationId xmlns:p14="http://schemas.microsoft.com/office/powerpoint/2010/main" val="3966538464"/>
+        <p14:creationId xmlns:p14="http://schemas.microsoft.com/office/powerpoint/2010/main" val="169951126"/>
       </p:ext>
     </p:extLst>
   </p:cSld>
@@ -4228,7 +4329,7 @@
                   <a:schemeClr val="bg1"/>
                 </a:solidFill>
               </a:rPr>
-              <a:t>Interesting results</a:t>
+              <a:t>Best optimum sort - Sorted</a:t>
             </a:r>
             <a:endParaRPr lang="fr-FR" sz="4000" b="1" dirty="0">
               <a:solidFill>
@@ -4241,7 +4342,7 @@
     </p:spTree>
     <p:extLst>
       <p:ext uri="{BB962C8B-B14F-4D97-AF65-F5344CB8AC3E}">
-        <p14:creationId xmlns:p14="http://schemas.microsoft.com/office/powerpoint/2010/main" val="2906460820"/>
+        <p14:creationId xmlns:p14="http://schemas.microsoft.com/office/powerpoint/2010/main" val="2903659727"/>
       </p:ext>
     </p:extLst>
   </p:cSld>
@@ -4390,7 +4491,7 @@
                   <a:schemeClr val="bg1"/>
                 </a:solidFill>
               </a:rPr>
-              <a:t>Conclusion</a:t>
+              <a:t>Best optimum sort - Reversed</a:t>
             </a:r>
             <a:endParaRPr lang="fr-FR" sz="4000" b="1" dirty="0">
               <a:solidFill>
@@ -4403,7 +4504,7 @@
     </p:spTree>
     <p:extLst>
       <p:ext uri="{BB962C8B-B14F-4D97-AF65-F5344CB8AC3E}">
-        <p14:creationId xmlns:p14="http://schemas.microsoft.com/office/powerpoint/2010/main" val="2944309065"/>
+        <p14:creationId xmlns:p14="http://schemas.microsoft.com/office/powerpoint/2010/main" val="2187059137"/>
       </p:ext>
     </p:extLst>
   </p:cSld>
@@ -4552,7 +4653,7 @@
                   <a:schemeClr val="bg1"/>
                 </a:solidFill>
               </a:rPr>
-              <a:t>Conclusion</a:t>
+              <a:t>Quick sort pivots</a:t>
             </a:r>
             <a:endParaRPr lang="fr-FR" sz="4000" b="1" dirty="0">
               <a:solidFill>
@@ -4565,7 +4666,7 @@
     </p:spTree>
     <p:extLst>
       <p:ext uri="{BB962C8B-B14F-4D97-AF65-F5344CB8AC3E}">
-        <p14:creationId xmlns:p14="http://schemas.microsoft.com/office/powerpoint/2010/main" val="2565790420"/>
+        <p14:creationId xmlns:p14="http://schemas.microsoft.com/office/powerpoint/2010/main" val="15967497"/>
       </p:ext>
     </p:extLst>
   </p:cSld>
@@ -4582,7 +4683,7 @@
 </p:sld>
 </file>
 
-<file path=ppt/slides/slide2.xml><?xml version="1.0" encoding="utf-8"?>
+<file path=ppt/slides/slide19.xml><?xml version="1.0" encoding="utf-8"?>
 <p:sld xmlns:a="http://schemas.openxmlformats.org/drawingml/2006/main" xmlns:r="http://schemas.openxmlformats.org/officeDocument/2006/relationships" xmlns:p="http://schemas.openxmlformats.org/presentationml/2006/main">
   <p:cSld>
     <p:spTree>
@@ -4639,25 +4740,84 @@
             <p:ph type="ctrTitle"/>
           </p:nvPr>
         </p:nvSpPr>
-        <p:spPr>
-          <a:xfrm>
-            <a:off x="1281775" y="-258320"/>
+        <p:spPr/>
+        <p:txBody>
+          <a:bodyPr/>
+          <a:lstStyle/>
+          <a:p>
+            <a:endParaRPr lang="fr-FR" dirty="0"/>
+          </a:p>
+        </p:txBody>
+      </p:sp>
+      <p:sp>
+        <p:nvSpPr>
+          <p:cNvPr id="3" name="Subtitle 2"/>
+          <p:cNvSpPr>
+            <a:spLocks noGrp="1"/>
+          </p:cNvSpPr>
+          <p:nvPr>
+            <p:ph type="subTitle" idx="1"/>
+          </p:nvPr>
+        </p:nvSpPr>
+        <p:spPr/>
+        <p:txBody>
+          <a:bodyPr/>
+          <a:lstStyle/>
+          <a:p>
+            <a:endParaRPr lang="fr-FR" dirty="0"/>
+          </a:p>
+        </p:txBody>
+      </p:sp>
+      <p:sp>
+        <p:nvSpPr>
+          <p:cNvPr id="7" name="Title 1"/>
+          <p:cNvSpPr txBox="1">
+            <a:spLocks/>
+          </p:cNvSpPr>
+          <p:nvPr/>
+        </p:nvSpPr>
+        <p:spPr>
+          <a:xfrm>
+            <a:off x="1221219" y="-1193800"/>
             <a:ext cx="9144000" cy="2387600"/>
           </a:xfrm>
-        </p:spPr>
-        <p:txBody>
-          <a:bodyPr/>
-          <a:lstStyle/>
-          <a:p>
-            <a:r>
-              <a:rPr lang="en-US" b="1" dirty="0" smtClean="0">
+          <a:prstGeom prst="rect">
+            <a:avLst/>
+          </a:prstGeom>
+        </p:spPr>
+        <p:txBody>
+          <a:bodyPr vert="horz" lIns="91440" tIns="45720" rIns="91440" bIns="45720" rtlCol="0" anchor="b">
+            <a:normAutofit/>
+          </a:bodyPr>
+          <a:lstStyle>
+            <a:lvl1pPr algn="ctr" defTabSz="914400" rtl="0" eaLnBrk="1" latinLnBrk="0" hangingPunct="1">
+              <a:lnSpc>
+                <a:spcPct val="90000"/>
+              </a:lnSpc>
+              <a:spcBef>
+                <a:spcPct val="0"/>
+              </a:spcBef>
+              <a:buNone/>
+              <a:defRPr sz="6000" kern="1200">
+                <a:solidFill>
+                  <a:schemeClr val="tx1"/>
+                </a:solidFill>
+                <a:latin typeface="+mj-lt"/>
+                <a:ea typeface="+mj-ea"/>
+                <a:cs typeface="+mj-cs"/>
+              </a:defRPr>
+            </a:lvl1pPr>
+          </a:lstStyle>
+          <a:p>
+            <a:r>
+              <a:rPr lang="en-US" sz="4000" b="1" dirty="0" smtClean="0">
                 <a:solidFill>
                   <a:schemeClr val="bg1"/>
                 </a:solidFill>
               </a:rPr>
-              <a:t>Sorts competition</a:t>
-            </a:r>
-            <a:endParaRPr lang="fr-FR" b="1" dirty="0">
+              <a:t>Quick sort pivots</a:t>
+            </a:r>
+            <a:endParaRPr lang="fr-FR" sz="4000" b="1" dirty="0">
               <a:solidFill>
                 <a:schemeClr val="bg1"/>
               </a:solidFill>
@@ -4665,65 +4825,10 @@
           </a:p>
         </p:txBody>
       </p:sp>
-      <p:sp>
-        <p:nvSpPr>
-          <p:cNvPr id="3" name="Subtitle 2"/>
-          <p:cNvSpPr>
-            <a:spLocks noGrp="1"/>
-          </p:cNvSpPr>
-          <p:nvPr>
-            <p:ph type="subTitle" idx="1"/>
-          </p:nvPr>
-        </p:nvSpPr>
-        <p:spPr/>
-        <p:txBody>
-          <a:bodyPr/>
-          <a:lstStyle/>
-          <a:p>
-            <a:r>
-              <a:rPr lang="en-US" dirty="0" smtClean="0"/>
-              <a:t>BENZA </a:t>
-            </a:r>
-            <a:endParaRPr lang="fr-FR" dirty="0"/>
-          </a:p>
-        </p:txBody>
-      </p:sp>
-      <p:sp>
-        <p:nvSpPr>
-          <p:cNvPr id="5" name="Rectangle 4"/>
-          <p:cNvSpPr/>
-          <p:nvPr/>
-        </p:nvSpPr>
-        <p:spPr>
-          <a:xfrm>
-            <a:off x="3931113" y="2070323"/>
-            <a:ext cx="6096000" cy="369332"/>
-          </a:xfrm>
-          <a:prstGeom prst="rect">
-            <a:avLst/>
-          </a:prstGeom>
-        </p:spPr>
-        <p:txBody>
-          <a:bodyPr>
-            <a:spAutoFit/>
-          </a:bodyPr>
-          <a:lstStyle/>
-          <a:p>
-            <a:r>
-              <a:rPr lang="en-US" dirty="0" smtClean="0">
-                <a:solidFill>
-                  <a:schemeClr val="bg1"/>
-                </a:solidFill>
-              </a:rPr>
-              <a:t>BENZA Amandine – FORNALI Damien</a:t>
-            </a:r>
-          </a:p>
-        </p:txBody>
-      </p:sp>
     </p:spTree>
     <p:extLst>
       <p:ext uri="{BB962C8B-B14F-4D97-AF65-F5344CB8AC3E}">
-        <p14:creationId xmlns:p14="http://schemas.microsoft.com/office/powerpoint/2010/main" val="3943499016"/>
+        <p14:creationId xmlns:p14="http://schemas.microsoft.com/office/powerpoint/2010/main" val="3711881733"/>
       </p:ext>
     </p:extLst>
   </p:cSld>
@@ -4740,7 +4845,150 @@
 </p:sld>
 </file>
 
-<file path=ppt/slides/slide3.xml><?xml version="1.0" encoding="utf-8"?>
+<file path=ppt/slides/slide2.xml><?xml version="1.0" encoding="utf-8"?>
+<p:sld xmlns:a="http://schemas.openxmlformats.org/drawingml/2006/main" xmlns:r="http://schemas.openxmlformats.org/officeDocument/2006/relationships" xmlns:p="http://schemas.openxmlformats.org/presentationml/2006/main">
+  <p:cSld>
+    <p:spTree>
+      <p:nvGrpSpPr>
+        <p:cNvPr id="1" name=""/>
+        <p:cNvGrpSpPr/>
+        <p:nvPr/>
+      </p:nvGrpSpPr>
+      <p:grpSpPr>
+        <a:xfrm>
+          <a:off x="0" y="0"/>
+          <a:ext cx="0" cy="0"/>
+          <a:chOff x="0" y="0"/>
+          <a:chExt cx="0" cy="0"/>
+        </a:xfrm>
+      </p:grpSpPr>
+      <p:pic>
+        <p:nvPicPr>
+          <p:cNvPr id="6" name="Content Placeholder 5"/>
+          <p:cNvPicPr>
+            <a:picLocks noGrp="1" noChangeAspect="1"/>
+          </p:cNvPicPr>
+          <p:nvPr>
+            <p:ph idx="1"/>
+          </p:nvPr>
+        </p:nvPicPr>
+        <p:blipFill>
+          <a:blip r:embed="rId2" cstate="print">
+            <a:extLst>
+              <a:ext uri="{28A0092B-C50C-407E-A947-70E740481C1C}">
+                <a14:useLocalDpi xmlns:a14="http://schemas.microsoft.com/office/drawing/2010/main" val="0"/>
+              </a:ext>
+            </a:extLst>
+          </a:blip>
+          <a:stretch>
+            <a:fillRect/>
+          </a:stretch>
+        </p:blipFill>
+        <p:spPr>
+          <a:xfrm>
+            <a:off x="0" y="0"/>
+            <a:ext cx="12192000" cy="6858000"/>
+          </a:xfrm>
+        </p:spPr>
+      </p:pic>
+      <p:sp>
+        <p:nvSpPr>
+          <p:cNvPr id="2" name="Title 1"/>
+          <p:cNvSpPr>
+            <a:spLocks noGrp="1"/>
+          </p:cNvSpPr>
+          <p:nvPr>
+            <p:ph type="title"/>
+          </p:nvPr>
+        </p:nvSpPr>
+        <p:spPr>
+          <a:xfrm>
+            <a:off x="-1214659" y="490462"/>
+            <a:ext cx="10515600" cy="1325563"/>
+          </a:xfrm>
+        </p:spPr>
+        <p:txBody>
+          <a:bodyPr>
+            <a:normAutofit fontScale="90000"/>
+          </a:bodyPr>
+          <a:lstStyle/>
+          <a:p>
+            <a:pPr algn="ctr"/>
+            <a:r>
+              <a:rPr lang="en-US" sz="6000" b="1" dirty="0" smtClean="0"/>
+              <a:t>Optimum vs non-optimum</a:t>
+            </a:r>
+            <a:br>
+              <a:rPr lang="en-US" sz="6000" b="1" dirty="0" smtClean="0"/>
+            </a:br>
+            <a:endParaRPr lang="fr-FR" sz="6000" b="1" dirty="0"/>
+          </a:p>
+        </p:txBody>
+      </p:sp>
+      <p:sp>
+        <p:nvSpPr>
+          <p:cNvPr id="7" name="Rectangle 6"/>
+          <p:cNvSpPr/>
+          <p:nvPr/>
+        </p:nvSpPr>
+        <p:spPr>
+          <a:xfrm>
+            <a:off x="1993311" y="1153243"/>
+            <a:ext cx="6096000" cy="338554"/>
+          </a:xfrm>
+          <a:prstGeom prst="rect">
+            <a:avLst/>
+          </a:prstGeom>
+        </p:spPr>
+        <p:txBody>
+          <a:bodyPr>
+            <a:spAutoFit/>
+          </a:bodyPr>
+          <a:lstStyle/>
+          <a:p>
+            <a:r>
+              <a:rPr lang="en-US" sz="1600" i="1" dirty="0" smtClean="0">
+                <a:solidFill>
+                  <a:schemeClr val="tx1">
+                    <a:lumMod val="65000"/>
+                    <a:lumOff val="35000"/>
+                  </a:schemeClr>
+                </a:solidFill>
+              </a:rPr>
+              <a:t>Merge / Heap / Smooth VS Insertion / Quick</a:t>
+            </a:r>
+            <a:endParaRPr lang="en-US" sz="1600" i="1" dirty="0" smtClean="0">
+              <a:solidFill>
+                <a:schemeClr val="tx1">
+                  <a:lumMod val="65000"/>
+                  <a:lumOff val="35000"/>
+                </a:schemeClr>
+              </a:solidFill>
+            </a:endParaRPr>
+          </a:p>
+        </p:txBody>
+      </p:sp>
+    </p:spTree>
+    <p:extLst>
+      <p:ext uri="{BB962C8B-B14F-4D97-AF65-F5344CB8AC3E}">
+        <p14:creationId xmlns:p14="http://schemas.microsoft.com/office/powerpoint/2010/main" val="621169876"/>
+      </p:ext>
+    </p:extLst>
+  </p:cSld>
+  <p:clrMapOvr>
+    <a:masterClrMapping/>
+  </p:clrMapOvr>
+  <p:timing>
+    <p:tnLst>
+      <p:par>
+        <p:cTn id="1" dur="indefinite" restart="never" nodeType="tmRoot"/>
+      </p:par>
+    </p:tnLst>
+  </p:timing>
+</p:sld>
+</file>
+
+<file path=ppt/slides/slide20.xml><?xml version="1.0" encoding="utf-8"?>
 <p:sld xmlns:a="http://schemas.openxmlformats.org/drawingml/2006/main" xmlns:r="http://schemas.openxmlformats.org/officeDocument/2006/relationships" xmlns:p="http://schemas.openxmlformats.org/presentationml/2006/main">
   <p:cSld>
     <p:spTree>
@@ -4872,7 +5120,7 @@
                   <a:schemeClr val="bg1"/>
                 </a:solidFill>
               </a:rPr>
-              <a:t>Optimum vs non-optimum sorts</a:t>
+              <a:t>Quick sort threshold values</a:t>
             </a:r>
             <a:endParaRPr lang="fr-FR" sz="4000" b="1" dirty="0">
               <a:solidFill>
@@ -4885,7 +5133,7 @@
     </p:spTree>
     <p:extLst>
       <p:ext uri="{BB962C8B-B14F-4D97-AF65-F5344CB8AC3E}">
-        <p14:creationId xmlns:p14="http://schemas.microsoft.com/office/powerpoint/2010/main" val="3323054275"/>
+        <p14:creationId xmlns:p14="http://schemas.microsoft.com/office/powerpoint/2010/main" val="1777590545"/>
       </p:ext>
     </p:extLst>
   </p:cSld>
@@ -4902,7 +5150,7 @@
 </p:sld>
 </file>
 
-<file path=ppt/slides/slide4.xml><?xml version="1.0" encoding="utf-8"?>
+<file path=ppt/slides/slide21.xml><?xml version="1.0" encoding="utf-8"?>
 <p:sld xmlns:a="http://schemas.openxmlformats.org/drawingml/2006/main" xmlns:r="http://schemas.openxmlformats.org/officeDocument/2006/relationships" xmlns:p="http://schemas.openxmlformats.org/presentationml/2006/main">
   <p:cSld>
     <p:spTree>
@@ -5034,7 +5282,7 @@
                   <a:schemeClr val="bg1"/>
                 </a:solidFill>
               </a:rPr>
-              <a:t>Optimum vs non-optimum sorts</a:t>
+              <a:t>Quick sort threshold values</a:t>
             </a:r>
             <a:endParaRPr lang="fr-FR" sz="4000" b="1" dirty="0">
               <a:solidFill>
@@ -5047,7 +5295,7 @@
     </p:spTree>
     <p:extLst>
       <p:ext uri="{BB962C8B-B14F-4D97-AF65-F5344CB8AC3E}">
-        <p14:creationId xmlns:p14="http://schemas.microsoft.com/office/powerpoint/2010/main" val="760186330"/>
+        <p14:creationId xmlns:p14="http://schemas.microsoft.com/office/powerpoint/2010/main" val="4283506139"/>
       </p:ext>
     </p:extLst>
   </p:cSld>
@@ -5064,7 +5312,7 @@
 </p:sld>
 </file>
 
-<file path=ppt/slides/slide5.xml><?xml version="1.0" encoding="utf-8"?>
+<file path=ppt/slides/slide22.xml><?xml version="1.0" encoding="utf-8"?>
 <p:sld xmlns:a="http://schemas.openxmlformats.org/drawingml/2006/main" xmlns:r="http://schemas.openxmlformats.org/officeDocument/2006/relationships" xmlns:p="http://schemas.openxmlformats.org/presentationml/2006/main">
   <p:cSld>
     <p:spTree>
@@ -5196,7 +5444,7 @@
                   <a:schemeClr val="bg1"/>
                 </a:solidFill>
               </a:rPr>
-              <a:t>Best optimum sort - Random</a:t>
+              <a:t>Interesting results</a:t>
             </a:r>
             <a:endParaRPr lang="fr-FR" sz="4000" b="1" dirty="0">
               <a:solidFill>
@@ -5206,54 +5454,16 @@
           </a:p>
         </p:txBody>
       </p:sp>
-      <p:pic>
-        <p:nvPicPr>
-          <p:cNvPr id="8" name="Picture 7"/>
-          <p:cNvPicPr>
-            <a:picLocks noChangeAspect="1"/>
-          </p:cNvPicPr>
-          <p:nvPr/>
-        </p:nvPicPr>
-        <p:blipFill>
-          <a:blip r:embed="rId3" cstate="print">
-            <a:extLst>
-              <a:ext uri="{28A0092B-C50C-407E-A947-70E740481C1C}">
-                <a14:useLocalDpi xmlns:a14="http://schemas.microsoft.com/office/drawing/2010/main" val="0"/>
-              </a:ext>
-            </a:extLst>
-          </a:blip>
-          <a:stretch>
-            <a:fillRect/>
-          </a:stretch>
-        </p:blipFill>
-        <p:spPr>
-          <a:xfrm>
-            <a:off x="1027086" y="1277620"/>
-            <a:ext cx="9963528" cy="5307127"/>
-          </a:xfrm>
-          <a:prstGeom prst="rect">
-            <a:avLst/>
-          </a:prstGeom>
-        </p:spPr>
-      </p:pic>
     </p:spTree>
     <p:extLst>
       <p:ext uri="{BB962C8B-B14F-4D97-AF65-F5344CB8AC3E}">
-        <p14:creationId xmlns:p14="http://schemas.microsoft.com/office/powerpoint/2010/main" val="348667985"/>
+        <p14:creationId xmlns:p14="http://schemas.microsoft.com/office/powerpoint/2010/main" val="3966538464"/>
       </p:ext>
     </p:extLst>
   </p:cSld>
   <p:clrMapOvr>
     <a:masterClrMapping/>
   </p:clrMapOvr>
-  <mc:AlternateContent xmlns:mc="http://schemas.openxmlformats.org/markup-compatibility/2006">
-    <mc:Choice xmlns:p14="http://schemas.microsoft.com/office/powerpoint/2010/main" Requires="p14">
-      <p:transition spd="slow" p14:dur="2000"/>
-    </mc:Choice>
-    <mc:Fallback>
-      <p:transition spd="slow"/>
-    </mc:Fallback>
-  </mc:AlternateContent>
   <p:timing>
     <p:tnLst>
       <p:par>
@@ -5264,8 +5474,8 @@
 </p:sld>
 </file>
 
-<file path=ppt/slides/slide6.xml><?xml version="1.0" encoding="utf-8"?>
-<p:sld xmlns:a="http://schemas.openxmlformats.org/drawingml/2006/main" xmlns:r="http://schemas.openxmlformats.org/officeDocument/2006/relationships" xmlns:p="http://schemas.openxmlformats.org/presentationml/2006/main" show="0">
+<file path=ppt/slides/slide23.xml><?xml version="1.0" encoding="utf-8"?>
+<p:sld xmlns:a="http://schemas.openxmlformats.org/drawingml/2006/main" xmlns:r="http://schemas.openxmlformats.org/officeDocument/2006/relationships" xmlns:p="http://schemas.openxmlformats.org/presentationml/2006/main">
   <p:cSld>
     <p:spTree>
       <p:nvGrpSpPr>
@@ -5396,7 +5606,7 @@
                   <a:schemeClr val="bg1"/>
                 </a:solidFill>
               </a:rPr>
-              <a:t>Best optimum sort - Random</a:t>
+              <a:t>Interesting results</a:t>
             </a:r>
             <a:endParaRPr lang="fr-FR" sz="4000" b="1" dirty="0">
               <a:solidFill>
@@ -5406,54 +5616,16 @@
           </a:p>
         </p:txBody>
       </p:sp>
-      <p:pic>
-        <p:nvPicPr>
-          <p:cNvPr id="5" name="Picture 4"/>
-          <p:cNvPicPr>
-            <a:picLocks noChangeAspect="1"/>
-          </p:cNvPicPr>
-          <p:nvPr/>
-        </p:nvPicPr>
-        <p:blipFill>
-          <a:blip r:embed="rId3" cstate="print">
-            <a:extLst>
-              <a:ext uri="{28A0092B-C50C-407E-A947-70E740481C1C}">
-                <a14:useLocalDpi xmlns:a14="http://schemas.microsoft.com/office/drawing/2010/main" val="0"/>
-              </a:ext>
-            </a:extLst>
-          </a:blip>
-          <a:stretch>
-            <a:fillRect/>
-          </a:stretch>
-        </p:blipFill>
-        <p:spPr>
-          <a:xfrm>
-            <a:off x="1043939" y="1270000"/>
-            <a:ext cx="9964800" cy="5307551"/>
-          </a:xfrm>
-          <a:prstGeom prst="rect">
-            <a:avLst/>
-          </a:prstGeom>
-        </p:spPr>
-      </p:pic>
     </p:spTree>
     <p:extLst>
       <p:ext uri="{BB962C8B-B14F-4D97-AF65-F5344CB8AC3E}">
-        <p14:creationId xmlns:p14="http://schemas.microsoft.com/office/powerpoint/2010/main" val="2071232805"/>
+        <p14:creationId xmlns:p14="http://schemas.microsoft.com/office/powerpoint/2010/main" val="2906460820"/>
       </p:ext>
     </p:extLst>
   </p:cSld>
   <p:clrMapOvr>
     <a:masterClrMapping/>
   </p:clrMapOvr>
-  <mc:AlternateContent xmlns:mc="http://schemas.openxmlformats.org/markup-compatibility/2006">
-    <mc:Choice xmlns:p14="http://schemas.microsoft.com/office/powerpoint/2010/main" Requires="p14">
-      <p:transition spd="slow" p14:dur="2000"/>
-    </mc:Choice>
-    <mc:Fallback>
-      <p:transition spd="slow"/>
-    </mc:Fallback>
-  </mc:AlternateContent>
   <p:timing>
     <p:tnLst>
       <p:par>
@@ -5464,8 +5636,8 @@
 </p:sld>
 </file>
 
-<file path=ppt/slides/slide7.xml><?xml version="1.0" encoding="utf-8"?>
-<p:sld xmlns:a="http://schemas.openxmlformats.org/drawingml/2006/main" xmlns:r="http://schemas.openxmlformats.org/officeDocument/2006/relationships" xmlns:p="http://schemas.openxmlformats.org/presentationml/2006/main" show="0">
+<file path=ppt/slides/slide24.xml><?xml version="1.0" encoding="utf-8"?>
+<p:sld xmlns:a="http://schemas.openxmlformats.org/drawingml/2006/main" xmlns:r="http://schemas.openxmlformats.org/officeDocument/2006/relationships" xmlns:p="http://schemas.openxmlformats.org/presentationml/2006/main">
   <p:cSld>
     <p:spTree>
       <p:nvGrpSpPr>
@@ -5596,7 +5768,7 @@
                   <a:schemeClr val="bg1"/>
                 </a:solidFill>
               </a:rPr>
-              <a:t>Best optimum sort - Random</a:t>
+              <a:t>Conclusion</a:t>
             </a:r>
             <a:endParaRPr lang="fr-FR" sz="4000" b="1" dirty="0">
               <a:solidFill>
@@ -5606,16 +5778,53 @@
           </a:p>
         </p:txBody>
       </p:sp>
+    </p:spTree>
+    <p:extLst>
+      <p:ext uri="{BB962C8B-B14F-4D97-AF65-F5344CB8AC3E}">
+        <p14:creationId xmlns:p14="http://schemas.microsoft.com/office/powerpoint/2010/main" val="2944309065"/>
+      </p:ext>
+    </p:extLst>
+  </p:cSld>
+  <p:clrMapOvr>
+    <a:masterClrMapping/>
+  </p:clrMapOvr>
+  <p:timing>
+    <p:tnLst>
+      <p:par>
+        <p:cTn id="1" dur="indefinite" restart="never" nodeType="tmRoot"/>
+      </p:par>
+    </p:tnLst>
+  </p:timing>
+</p:sld>
+</file>
+
+<file path=ppt/slides/slide25.xml><?xml version="1.0" encoding="utf-8"?>
+<p:sld xmlns:a="http://schemas.openxmlformats.org/drawingml/2006/main" xmlns:r="http://schemas.openxmlformats.org/officeDocument/2006/relationships" xmlns:p="http://schemas.openxmlformats.org/presentationml/2006/main">
+  <p:cSld>
+    <p:spTree>
+      <p:nvGrpSpPr>
+        <p:cNvPr id="1" name=""/>
+        <p:cNvGrpSpPr/>
+        <p:nvPr/>
+      </p:nvGrpSpPr>
+      <p:grpSpPr>
+        <a:xfrm>
+          <a:off x="0" y="0"/>
+          <a:ext cx="0" cy="0"/>
+          <a:chOff x="0" y="0"/>
+          <a:chExt cx="0" cy="0"/>
+        </a:xfrm>
+      </p:grpSpPr>
       <p:pic>
         <p:nvPicPr>
-          <p:cNvPr id="5" name="Picture 4"/>
+          <p:cNvPr id="4" name="Picture 3"/>
           <p:cNvPicPr>
             <a:picLocks noChangeAspect="1"/>
           </p:cNvPicPr>
           <p:nvPr/>
         </p:nvPicPr>
         <p:blipFill>
-          <a:blip r:embed="rId3" cstate="print">
+          <a:blip r:embed="rId2">
             <a:extLst>
               <a:ext uri="{28A0092B-C50C-407E-A947-70E740481C1C}">
                 <a14:useLocalDpi xmlns:a14="http://schemas.microsoft.com/office/drawing/2010/main" val="0"/>
@@ -5628,29 +5837,839 @@
         </p:blipFill>
         <p:spPr>
           <a:xfrm>
-            <a:off x="1013460" y="1262380"/>
-            <a:ext cx="9964800" cy="5301835"/>
+            <a:off x="0" y="0"/>
+            <a:ext cx="12192000" cy="6858000"/>
           </a:xfrm>
           <a:prstGeom prst="rect">
             <a:avLst/>
           </a:prstGeom>
         </p:spPr>
       </p:pic>
+      <p:sp>
+        <p:nvSpPr>
+          <p:cNvPr id="2" name="Title 1"/>
+          <p:cNvSpPr>
+            <a:spLocks noGrp="1"/>
+          </p:cNvSpPr>
+          <p:nvPr>
+            <p:ph type="ctrTitle"/>
+          </p:nvPr>
+        </p:nvSpPr>
+        <p:spPr/>
+        <p:txBody>
+          <a:bodyPr/>
+          <a:lstStyle/>
+          <a:p>
+            <a:endParaRPr lang="fr-FR" dirty="0"/>
+          </a:p>
+        </p:txBody>
+      </p:sp>
+      <p:sp>
+        <p:nvSpPr>
+          <p:cNvPr id="3" name="Subtitle 2"/>
+          <p:cNvSpPr>
+            <a:spLocks noGrp="1"/>
+          </p:cNvSpPr>
+          <p:nvPr>
+            <p:ph type="subTitle" idx="1"/>
+          </p:nvPr>
+        </p:nvSpPr>
+        <p:spPr/>
+        <p:txBody>
+          <a:bodyPr/>
+          <a:lstStyle/>
+          <a:p>
+            <a:endParaRPr lang="fr-FR" dirty="0"/>
+          </a:p>
+        </p:txBody>
+      </p:sp>
+      <p:sp>
+        <p:nvSpPr>
+          <p:cNvPr id="7" name="Title 1"/>
+          <p:cNvSpPr txBox="1">
+            <a:spLocks/>
+          </p:cNvSpPr>
+          <p:nvPr/>
+        </p:nvSpPr>
+        <p:spPr>
+          <a:xfrm>
+            <a:off x="1221219" y="-1193800"/>
+            <a:ext cx="9144000" cy="2387600"/>
+          </a:xfrm>
+          <a:prstGeom prst="rect">
+            <a:avLst/>
+          </a:prstGeom>
+        </p:spPr>
+        <p:txBody>
+          <a:bodyPr vert="horz" lIns="91440" tIns="45720" rIns="91440" bIns="45720" rtlCol="0" anchor="b">
+            <a:normAutofit/>
+          </a:bodyPr>
+          <a:lstStyle>
+            <a:lvl1pPr algn="ctr" defTabSz="914400" rtl="0" eaLnBrk="1" latinLnBrk="0" hangingPunct="1">
+              <a:lnSpc>
+                <a:spcPct val="90000"/>
+              </a:lnSpc>
+              <a:spcBef>
+                <a:spcPct val="0"/>
+              </a:spcBef>
+              <a:buNone/>
+              <a:defRPr sz="6000" kern="1200">
+                <a:solidFill>
+                  <a:schemeClr val="tx1"/>
+                </a:solidFill>
+                <a:latin typeface="+mj-lt"/>
+                <a:ea typeface="+mj-ea"/>
+                <a:cs typeface="+mj-cs"/>
+              </a:defRPr>
+            </a:lvl1pPr>
+          </a:lstStyle>
+          <a:p>
+            <a:r>
+              <a:rPr lang="en-US" sz="4000" b="1" dirty="0" smtClean="0">
+                <a:solidFill>
+                  <a:schemeClr val="bg1"/>
+                </a:solidFill>
+              </a:rPr>
+              <a:t>Conclusion</a:t>
+            </a:r>
+            <a:endParaRPr lang="fr-FR" sz="4000" b="1" dirty="0">
+              <a:solidFill>
+                <a:schemeClr val="bg1"/>
+              </a:solidFill>
+            </a:endParaRPr>
+          </a:p>
+        </p:txBody>
+      </p:sp>
     </p:spTree>
     <p:extLst>
       <p:ext uri="{BB962C8B-B14F-4D97-AF65-F5344CB8AC3E}">
-        <p14:creationId xmlns:p14="http://schemas.microsoft.com/office/powerpoint/2010/main" val="3112505893"/>
+        <p14:creationId xmlns:p14="http://schemas.microsoft.com/office/powerpoint/2010/main" val="2565790420"/>
       </p:ext>
     </p:extLst>
   </p:cSld>
   <p:clrMapOvr>
     <a:masterClrMapping/>
   </p:clrMapOvr>
-  <mc:AlternateContent xmlns:mc="http://schemas.openxmlformats.org/markup-compatibility/2006">
-    <mc:Choice xmlns:p14="http://schemas.microsoft.com/office/powerpoint/2010/main" Requires="p14">
+  <p:timing>
+    <p:tnLst>
+      <p:par>
+        <p:cTn id="1" dur="indefinite" restart="never" nodeType="tmRoot"/>
+      </p:par>
+    </p:tnLst>
+  </p:timing>
+</p:sld>
+</file>
+
+<file path=ppt/slides/slide3.xml><?xml version="1.0" encoding="utf-8"?>
+<p:sld xmlns:a="http://schemas.openxmlformats.org/drawingml/2006/main" xmlns:r="http://schemas.openxmlformats.org/officeDocument/2006/relationships" xmlns:p="http://schemas.openxmlformats.org/presentationml/2006/main">
+  <p:cSld>
+    <p:spTree>
+      <p:nvGrpSpPr>
+        <p:cNvPr id="1" name=""/>
+        <p:cNvGrpSpPr/>
+        <p:nvPr/>
+      </p:nvGrpSpPr>
+      <p:grpSpPr>
+        <a:xfrm>
+          <a:off x="0" y="0"/>
+          <a:ext cx="0" cy="0"/>
+          <a:chOff x="0" y="0"/>
+          <a:chExt cx="0" cy="0"/>
+        </a:xfrm>
+      </p:grpSpPr>
+      <p:pic>
+        <p:nvPicPr>
+          <p:cNvPr id="6" name="Content Placeholder 5"/>
+          <p:cNvPicPr>
+            <a:picLocks noGrp="1" noChangeAspect="1"/>
+          </p:cNvPicPr>
+          <p:nvPr>
+            <p:ph idx="1"/>
+          </p:nvPr>
+        </p:nvPicPr>
+        <p:blipFill>
+          <a:blip r:embed="rId2" cstate="print">
+            <a:extLst>
+              <a:ext uri="{28A0092B-C50C-407E-A947-70E740481C1C}">
+                <a14:useLocalDpi xmlns:a14="http://schemas.microsoft.com/office/drawing/2010/main" val="0"/>
+              </a:ext>
+            </a:extLst>
+          </a:blip>
+          <a:stretch>
+            <a:fillRect/>
+          </a:stretch>
+        </p:blipFill>
+        <p:spPr>
+          <a:xfrm>
+            <a:off x="0" y="0"/>
+            <a:ext cx="12192000" cy="6858000"/>
+          </a:xfrm>
+        </p:spPr>
+      </p:pic>
+      <p:sp>
+        <p:nvSpPr>
+          <p:cNvPr id="9" name="Title 1"/>
+          <p:cNvSpPr>
+            <a:spLocks noGrp="1"/>
+          </p:cNvSpPr>
+          <p:nvPr>
+            <p:ph type="title"/>
+          </p:nvPr>
+        </p:nvSpPr>
+        <p:spPr>
+          <a:xfrm>
+            <a:off x="-1214659" y="490462"/>
+            <a:ext cx="10515600" cy="1325563"/>
+          </a:xfrm>
+        </p:spPr>
+        <p:txBody>
+          <a:bodyPr>
+            <a:normAutofit fontScale="90000"/>
+          </a:bodyPr>
+          <a:lstStyle/>
+          <a:p>
+            <a:pPr algn="ctr"/>
+            <a:r>
+              <a:rPr lang="en-US" sz="6000" b="1" dirty="0" smtClean="0"/>
+              <a:t>Best optimum sort</a:t>
+            </a:r>
+            <a:br>
+              <a:rPr lang="en-US" sz="6000" b="1" dirty="0" smtClean="0"/>
+            </a:br>
+            <a:endParaRPr lang="fr-FR" sz="6000" b="1" dirty="0"/>
+          </a:p>
+        </p:txBody>
+      </p:sp>
+      <p:sp>
+        <p:nvSpPr>
+          <p:cNvPr id="10" name="Rectangle 9"/>
+          <p:cNvSpPr/>
+          <p:nvPr/>
+        </p:nvSpPr>
+        <p:spPr>
+          <a:xfrm>
+            <a:off x="2750264" y="1153243"/>
+            <a:ext cx="6096000" cy="338554"/>
+          </a:xfrm>
+          <a:prstGeom prst="rect">
+            <a:avLst/>
+          </a:prstGeom>
+        </p:spPr>
+        <p:txBody>
+          <a:bodyPr>
+            <a:spAutoFit/>
+          </a:bodyPr>
+          <a:lstStyle/>
+          <a:p>
+            <a:r>
+              <a:rPr lang="en-US" sz="1600" i="1" dirty="0" smtClean="0">
+                <a:solidFill>
+                  <a:schemeClr val="tx1">
+                    <a:lumMod val="65000"/>
+                    <a:lumOff val="35000"/>
+                  </a:schemeClr>
+                </a:solidFill>
+              </a:rPr>
+              <a:t>Merge vs Heap vs Smooth</a:t>
+            </a:r>
+            <a:endParaRPr lang="en-US" sz="1600" i="1" dirty="0" smtClean="0">
+              <a:solidFill>
+                <a:schemeClr val="tx1">
+                  <a:lumMod val="65000"/>
+                  <a:lumOff val="35000"/>
+                </a:schemeClr>
+              </a:solidFill>
+            </a:endParaRPr>
+          </a:p>
+        </p:txBody>
+      </p:sp>
+    </p:spTree>
+    <p:extLst>
+      <p:ext uri="{BB962C8B-B14F-4D97-AF65-F5344CB8AC3E}">
+        <p14:creationId xmlns:p14="http://schemas.microsoft.com/office/powerpoint/2010/main" val="2350868961"/>
+      </p:ext>
+    </p:extLst>
+  </p:cSld>
+  <p:clrMapOvr>
+    <a:masterClrMapping/>
+  </p:clrMapOvr>
+  <p:timing>
+    <p:tnLst>
+      <p:par>
+        <p:cTn id="1" dur="indefinite" restart="never" nodeType="tmRoot"/>
+      </p:par>
+    </p:tnLst>
+  </p:timing>
+</p:sld>
+</file>
+
+<file path=ppt/slides/slide4.xml><?xml version="1.0" encoding="utf-8"?>
+<p:sld xmlns:a="http://schemas.openxmlformats.org/drawingml/2006/main" xmlns:r="http://schemas.openxmlformats.org/officeDocument/2006/relationships" xmlns:p="http://schemas.openxmlformats.org/presentationml/2006/main">
+  <p:cSld>
+    <p:spTree>
+      <p:nvGrpSpPr>
+        <p:cNvPr id="1" name=""/>
+        <p:cNvGrpSpPr/>
+        <p:nvPr/>
+      </p:nvGrpSpPr>
+      <p:grpSpPr>
+        <a:xfrm>
+          <a:off x="0" y="0"/>
+          <a:ext cx="0" cy="0"/>
+          <a:chOff x="0" y="0"/>
+          <a:chExt cx="0" cy="0"/>
+        </a:xfrm>
+      </p:grpSpPr>
+      <p:pic>
+        <p:nvPicPr>
+          <p:cNvPr id="6" name="Content Placeholder 5"/>
+          <p:cNvPicPr>
+            <a:picLocks noGrp="1" noChangeAspect="1"/>
+          </p:cNvPicPr>
+          <p:nvPr>
+            <p:ph idx="1"/>
+          </p:nvPr>
+        </p:nvPicPr>
+        <p:blipFill>
+          <a:blip r:embed="rId2" cstate="print">
+            <a:extLst>
+              <a:ext uri="{28A0092B-C50C-407E-A947-70E740481C1C}">
+                <a14:useLocalDpi xmlns:a14="http://schemas.microsoft.com/office/drawing/2010/main" val="0"/>
+              </a:ext>
+            </a:extLst>
+          </a:blip>
+          <a:stretch>
+            <a:fillRect/>
+          </a:stretch>
+        </p:blipFill>
+        <p:spPr>
+          <a:xfrm>
+            <a:off x="0" y="0"/>
+            <a:ext cx="12192000" cy="6858000"/>
+          </a:xfrm>
+        </p:spPr>
+      </p:pic>
+      <p:sp>
+        <p:nvSpPr>
+          <p:cNvPr id="3" name="Title 1"/>
+          <p:cNvSpPr>
+            <a:spLocks noGrp="1"/>
+          </p:cNvSpPr>
+          <p:nvPr>
+            <p:ph type="title"/>
+          </p:nvPr>
+        </p:nvSpPr>
+        <p:spPr>
+          <a:xfrm>
+            <a:off x="-1214659" y="490462"/>
+            <a:ext cx="10515600" cy="1325563"/>
+          </a:xfrm>
+        </p:spPr>
+        <p:txBody>
+          <a:bodyPr>
+            <a:normAutofit fontScale="90000"/>
+          </a:bodyPr>
+          <a:lstStyle/>
+          <a:p>
+            <a:pPr algn="ctr"/>
+            <a:r>
+              <a:rPr lang="en-US" sz="6000" b="1" dirty="0" smtClean="0"/>
+              <a:t>Quick sort</a:t>
+            </a:r>
+            <a:br>
+              <a:rPr lang="en-US" sz="6000" b="1" dirty="0" smtClean="0"/>
+            </a:br>
+            <a:endParaRPr lang="fr-FR" sz="6000" b="1" dirty="0"/>
+          </a:p>
+        </p:txBody>
+      </p:sp>
+      <p:sp>
+        <p:nvSpPr>
+          <p:cNvPr id="4" name="Rectangle 3"/>
+          <p:cNvSpPr/>
+          <p:nvPr/>
+        </p:nvSpPr>
+        <p:spPr>
+          <a:xfrm>
+            <a:off x="3204941" y="1153243"/>
+            <a:ext cx="6096000" cy="338554"/>
+          </a:xfrm>
+          <a:prstGeom prst="rect">
+            <a:avLst/>
+          </a:prstGeom>
+        </p:spPr>
+        <p:txBody>
+          <a:bodyPr>
+            <a:spAutoFit/>
+          </a:bodyPr>
+          <a:lstStyle/>
+          <a:p>
+            <a:r>
+              <a:rPr lang="en-US" sz="1600" i="1" dirty="0" smtClean="0">
+                <a:solidFill>
+                  <a:schemeClr val="tx1">
+                    <a:lumMod val="65000"/>
+                    <a:lumOff val="35000"/>
+                  </a:schemeClr>
+                </a:solidFill>
+              </a:rPr>
+              <a:t>Comparing pivots</a:t>
+            </a:r>
+            <a:endParaRPr lang="en-US" sz="1600" i="1" dirty="0" smtClean="0">
+              <a:solidFill>
+                <a:schemeClr val="tx1">
+                  <a:lumMod val="65000"/>
+                  <a:lumOff val="35000"/>
+                </a:schemeClr>
+              </a:solidFill>
+            </a:endParaRPr>
+          </a:p>
+        </p:txBody>
+      </p:sp>
+    </p:spTree>
+    <p:extLst>
+      <p:ext uri="{BB962C8B-B14F-4D97-AF65-F5344CB8AC3E}">
+        <p14:creationId xmlns:p14="http://schemas.microsoft.com/office/powerpoint/2010/main" val="3282887078"/>
+      </p:ext>
+    </p:extLst>
+  </p:cSld>
+  <p:clrMapOvr>
+    <a:masterClrMapping/>
+  </p:clrMapOvr>
+  <p:timing>
+    <p:tnLst>
+      <p:par>
+        <p:cTn id="1" dur="indefinite" restart="never" nodeType="tmRoot"/>
+      </p:par>
+    </p:tnLst>
+  </p:timing>
+</p:sld>
+</file>
+
+<file path=ppt/slides/slide5.xml><?xml version="1.0" encoding="utf-8"?>
+<p:sld xmlns:a="http://schemas.openxmlformats.org/drawingml/2006/main" xmlns:r="http://schemas.openxmlformats.org/officeDocument/2006/relationships" xmlns:p="http://schemas.openxmlformats.org/presentationml/2006/main">
+  <p:cSld>
+    <p:spTree>
+      <p:nvGrpSpPr>
+        <p:cNvPr id="1" name=""/>
+        <p:cNvGrpSpPr/>
+        <p:nvPr/>
+      </p:nvGrpSpPr>
+      <p:grpSpPr>
+        <a:xfrm>
+          <a:off x="0" y="0"/>
+          <a:ext cx="0" cy="0"/>
+          <a:chOff x="0" y="0"/>
+          <a:chExt cx="0" cy="0"/>
+        </a:xfrm>
+      </p:grpSpPr>
+      <p:pic>
+        <p:nvPicPr>
+          <p:cNvPr id="6" name="Content Placeholder 5"/>
+          <p:cNvPicPr>
+            <a:picLocks noGrp="1" noChangeAspect="1"/>
+          </p:cNvPicPr>
+          <p:nvPr>
+            <p:ph idx="1"/>
+          </p:nvPr>
+        </p:nvPicPr>
+        <p:blipFill>
+          <a:blip r:embed="rId2" cstate="print">
+            <a:extLst>
+              <a:ext uri="{28A0092B-C50C-407E-A947-70E740481C1C}">
+                <a14:useLocalDpi xmlns:a14="http://schemas.microsoft.com/office/drawing/2010/main" val="0"/>
+              </a:ext>
+            </a:extLst>
+          </a:blip>
+          <a:stretch>
+            <a:fillRect/>
+          </a:stretch>
+        </p:blipFill>
+        <p:spPr>
+          <a:xfrm>
+            <a:off x="0" y="0"/>
+            <a:ext cx="12192000" cy="6858000"/>
+          </a:xfrm>
+        </p:spPr>
+      </p:pic>
+      <p:sp>
+        <p:nvSpPr>
+          <p:cNvPr id="3" name="Title 1"/>
+          <p:cNvSpPr>
+            <a:spLocks noGrp="1"/>
+          </p:cNvSpPr>
+          <p:nvPr>
+            <p:ph type="title"/>
+          </p:nvPr>
+        </p:nvSpPr>
+        <p:spPr>
+          <a:xfrm>
+            <a:off x="-1214659" y="490462"/>
+            <a:ext cx="10515600" cy="1325563"/>
+          </a:xfrm>
+        </p:spPr>
+        <p:txBody>
+          <a:bodyPr>
+            <a:normAutofit fontScale="90000"/>
+          </a:bodyPr>
+          <a:lstStyle/>
+          <a:p>
+            <a:pPr algn="ctr"/>
+            <a:r>
+              <a:rPr lang="en-US" sz="6000" b="1" dirty="0" smtClean="0"/>
+              <a:t>Quick sort</a:t>
+            </a:r>
+            <a:br>
+              <a:rPr lang="en-US" sz="6000" b="1" dirty="0" smtClean="0"/>
+            </a:br>
+            <a:endParaRPr lang="fr-FR" sz="6000" b="1" dirty="0"/>
+          </a:p>
+        </p:txBody>
+      </p:sp>
+      <p:sp>
+        <p:nvSpPr>
+          <p:cNvPr id="4" name="Rectangle 3"/>
+          <p:cNvSpPr/>
+          <p:nvPr/>
+        </p:nvSpPr>
+        <p:spPr>
+          <a:xfrm>
+            <a:off x="2787103" y="1153243"/>
+            <a:ext cx="6096000" cy="338554"/>
+          </a:xfrm>
+          <a:prstGeom prst="rect">
+            <a:avLst/>
+          </a:prstGeom>
+        </p:spPr>
+        <p:txBody>
+          <a:bodyPr>
+            <a:spAutoFit/>
+          </a:bodyPr>
+          <a:lstStyle/>
+          <a:p>
+            <a:r>
+              <a:rPr lang="en-US" sz="1600" i="1" dirty="0" smtClean="0">
+                <a:solidFill>
+                  <a:schemeClr val="tx1">
+                    <a:lumMod val="65000"/>
+                    <a:lumOff val="35000"/>
+                  </a:schemeClr>
+                </a:solidFill>
+              </a:rPr>
+              <a:t>Comparing threshold values</a:t>
+            </a:r>
+            <a:endParaRPr lang="en-US" sz="1600" i="1" dirty="0" smtClean="0">
+              <a:solidFill>
+                <a:schemeClr val="tx1">
+                  <a:lumMod val="65000"/>
+                  <a:lumOff val="35000"/>
+                </a:schemeClr>
+              </a:solidFill>
+            </a:endParaRPr>
+          </a:p>
+        </p:txBody>
+      </p:sp>
+    </p:spTree>
+    <p:extLst>
+      <p:ext uri="{BB962C8B-B14F-4D97-AF65-F5344CB8AC3E}">
+        <p14:creationId xmlns:p14="http://schemas.microsoft.com/office/powerpoint/2010/main" val="1448575482"/>
+      </p:ext>
+    </p:extLst>
+  </p:cSld>
+  <p:clrMapOvr>
+    <a:masterClrMapping/>
+  </p:clrMapOvr>
+  <p:timing>
+    <p:tnLst>
+      <p:par>
+        <p:cTn id="1" dur="indefinite" restart="never" nodeType="tmRoot"/>
+      </p:par>
+    </p:tnLst>
+  </p:timing>
+</p:sld>
+</file>
+
+<file path=ppt/slides/slide6.xml><?xml version="1.0" encoding="utf-8"?>
+<p:sld xmlns:a="http://schemas.openxmlformats.org/drawingml/2006/main" xmlns:r="http://schemas.openxmlformats.org/officeDocument/2006/relationships" xmlns:p="http://schemas.openxmlformats.org/presentationml/2006/main">
+  <p:cSld>
+    <p:spTree>
+      <p:nvGrpSpPr>
+        <p:cNvPr id="1" name=""/>
+        <p:cNvGrpSpPr/>
+        <p:nvPr/>
+      </p:nvGrpSpPr>
+      <p:grpSpPr>
+        <a:xfrm>
+          <a:off x="0" y="0"/>
+          <a:ext cx="0" cy="0"/>
+          <a:chOff x="0" y="0"/>
+          <a:chExt cx="0" cy="0"/>
+        </a:xfrm>
+      </p:grpSpPr>
+      <p:pic>
+        <p:nvPicPr>
+          <p:cNvPr id="6" name="Content Placeholder 5"/>
+          <p:cNvPicPr>
+            <a:picLocks noGrp="1" noChangeAspect="1"/>
+          </p:cNvPicPr>
+          <p:nvPr>
+            <p:ph idx="1"/>
+          </p:nvPr>
+        </p:nvPicPr>
+        <p:blipFill>
+          <a:blip r:embed="rId2" cstate="print">
+            <a:extLst>
+              <a:ext uri="{28A0092B-C50C-407E-A947-70E740481C1C}">
+                <a14:useLocalDpi xmlns:a14="http://schemas.microsoft.com/office/drawing/2010/main" val="0"/>
+              </a:ext>
+            </a:extLst>
+          </a:blip>
+          <a:stretch>
+            <a:fillRect/>
+          </a:stretch>
+        </p:blipFill>
+        <p:spPr>
+          <a:xfrm>
+            <a:off x="0" y="0"/>
+            <a:ext cx="12192000" cy="6858000"/>
+          </a:xfrm>
+        </p:spPr>
+      </p:pic>
+      <p:sp>
+        <p:nvSpPr>
+          <p:cNvPr id="3" name="Title 1"/>
+          <p:cNvSpPr>
+            <a:spLocks noGrp="1"/>
+          </p:cNvSpPr>
+          <p:nvPr>
+            <p:ph type="title"/>
+          </p:nvPr>
+        </p:nvSpPr>
+        <p:spPr>
+          <a:xfrm>
+            <a:off x="-1087490" y="2204205"/>
+            <a:ext cx="10515600" cy="1325563"/>
+          </a:xfrm>
+        </p:spPr>
+        <p:txBody>
+          <a:bodyPr>
+            <a:normAutofit/>
+          </a:bodyPr>
+          <a:lstStyle/>
+          <a:p>
+            <a:pPr algn="ctr"/>
+            <a:r>
+              <a:rPr lang="en-US" sz="6000" b="1" dirty="0" smtClean="0"/>
+              <a:t>Conclusion</a:t>
+            </a:r>
+            <a:endParaRPr lang="fr-FR" sz="6000" b="1" dirty="0"/>
+          </a:p>
+        </p:txBody>
+      </p:sp>
+    </p:spTree>
+    <p:extLst>
+      <p:ext uri="{BB962C8B-B14F-4D97-AF65-F5344CB8AC3E}">
+        <p14:creationId xmlns:p14="http://schemas.microsoft.com/office/powerpoint/2010/main" val="3206080185"/>
+      </p:ext>
+    </p:extLst>
+  </p:cSld>
+  <p:clrMapOvr>
+    <a:masterClrMapping/>
+  </p:clrMapOvr>
+  <p:timing>
+    <p:tnLst>
+      <p:par>
+        <p:cTn id="1" dur="indefinite" restart="never" nodeType="tmRoot"/>
+      </p:par>
+    </p:tnLst>
+  </p:timing>
+</p:sld>
+</file>
+
+<file path=ppt/slides/slide7.xml><?xml version="1.0" encoding="utf-8"?>
+<p:sld xmlns:a="http://schemas.openxmlformats.org/drawingml/2006/main" xmlns:r="http://schemas.openxmlformats.org/officeDocument/2006/relationships" xmlns:p="http://schemas.openxmlformats.org/presentationml/2006/main" show="0">
+  <p:cSld>
+    <p:spTree>
+      <p:nvGrpSpPr>
+        <p:cNvPr id="1" name=""/>
+        <p:cNvGrpSpPr/>
+        <p:nvPr/>
+      </p:nvGrpSpPr>
+      <p:grpSpPr>
+        <a:xfrm>
+          <a:off x="0" y="0"/>
+          <a:ext cx="0" cy="0"/>
+          <a:chOff x="0" y="0"/>
+          <a:chExt cx="0" cy="0"/>
+        </a:xfrm>
+      </p:grpSpPr>
+      <p:sp>
+        <p:nvSpPr>
+          <p:cNvPr id="2" name="Title 1"/>
+          <p:cNvSpPr>
+            <a:spLocks noGrp="1"/>
+          </p:cNvSpPr>
+          <p:nvPr>
+            <p:ph type="ctrTitle"/>
+          </p:nvPr>
+        </p:nvSpPr>
+        <p:spPr>
+          <a:xfrm>
+            <a:off x="1524000" y="1122362"/>
+            <a:ext cx="9144000" cy="3280079"/>
+          </a:xfrm>
+        </p:spPr>
+        <p:txBody>
+          <a:bodyPr>
+            <a:noAutofit/>
+          </a:bodyPr>
+          <a:lstStyle/>
+          <a:p>
+            <a:pPr algn="l"/>
+            <a:r>
+              <a:rPr lang="fr-FR" sz="1800" dirty="0" smtClean="0"/>
+              <a:t/>
+            </a:r>
+            <a:br>
+              <a:rPr lang="fr-FR" sz="1800" dirty="0" smtClean="0"/>
+            </a:br>
+            <a:r>
+              <a:rPr lang="fr-FR" sz="1800" dirty="0" smtClean="0"/>
+              <a:t/>
+            </a:r>
+            <a:br>
+              <a:rPr lang="fr-FR" sz="1800" dirty="0" smtClean="0"/>
+            </a:br>
+            <a:r>
+              <a:rPr lang="fr-FR" sz="1800" dirty="0" smtClean="0"/>
+              <a:t>- Est-ce que je vois la différence entre tris optimaux (fusion, tas) et non optimaux (insertion, tri rapide dans certains cas) ?</a:t>
+            </a:r>
+            <a:br>
+              <a:rPr lang="fr-FR" sz="1800" dirty="0" smtClean="0"/>
+            </a:br>
+            <a:r>
+              <a:rPr lang="fr-FR" sz="1800" dirty="0" smtClean="0"/>
+              <a:t/>
+            </a:r>
+            <a:br>
+              <a:rPr lang="fr-FR" sz="1800" dirty="0" smtClean="0"/>
+            </a:br>
+            <a:r>
+              <a:rPr lang="fr-FR" sz="1800" dirty="0" smtClean="0"/>
+              <a:t>- Comparaison des tris optimaux, quel est le meilleur pour mon langage ?</a:t>
+            </a:r>
+            <a:br>
+              <a:rPr lang="fr-FR" sz="1800" dirty="0" smtClean="0"/>
+            </a:br>
+            <a:r>
+              <a:rPr lang="fr-FR" sz="1800" dirty="0" smtClean="0"/>
+              <a:t/>
+            </a:r>
+            <a:br>
+              <a:rPr lang="fr-FR" sz="1800" dirty="0" smtClean="0"/>
+            </a:br>
+            <a:r>
+              <a:rPr lang="fr-FR" sz="1800" dirty="0" smtClean="0"/>
+              <a:t>- Comparaisons des méthodes de choix de pivot sur le tri rapide</a:t>
+            </a:r>
+            <a:br>
+              <a:rPr lang="fr-FR" sz="1800" dirty="0" smtClean="0"/>
+            </a:br>
+            <a:r>
+              <a:rPr lang="fr-FR" sz="1800" dirty="0" smtClean="0"/>
+              <a:t/>
+            </a:r>
+            <a:br>
+              <a:rPr lang="fr-FR" sz="1800" dirty="0" smtClean="0"/>
+            </a:br>
+            <a:r>
+              <a:rPr lang="fr-FR" sz="1800" dirty="0" smtClean="0"/>
+              <a:t>- Comparaisons des valeurs de seuil pour le tri rapide</a:t>
+            </a:r>
+            <a:br>
+              <a:rPr lang="fr-FR" sz="1800" dirty="0" smtClean="0"/>
+            </a:br>
+            <a:r>
+              <a:rPr lang="fr-FR" sz="1800" dirty="0" smtClean="0"/>
+              <a:t/>
+            </a:r>
+            <a:br>
+              <a:rPr lang="fr-FR" sz="1800" dirty="0" smtClean="0"/>
+            </a:br>
+            <a:r>
+              <a:rPr lang="fr-FR" sz="1800" dirty="0" smtClean="0"/>
+              <a:t>- Autres résultats intéressants mis en lumière par le travail du binôme</a:t>
+            </a:r>
+            <a:br>
+              <a:rPr lang="fr-FR" sz="1800" dirty="0" smtClean="0"/>
+            </a:br>
+            <a:r>
+              <a:rPr lang="fr-FR" sz="1800" dirty="0" smtClean="0"/>
+              <a:t/>
+            </a:r>
+            <a:br>
+              <a:rPr lang="fr-FR" sz="1800" dirty="0" smtClean="0"/>
+            </a:br>
+            <a:r>
+              <a:rPr lang="fr-FR" sz="1800" dirty="0" smtClean="0"/>
+              <a:t>- Analyse et conclusion. (Qu'est-ce que j'ai appris ?) (modifié)</a:t>
+            </a:r>
+            <a:endParaRPr lang="fr-FR" sz="1800" dirty="0"/>
+          </a:p>
+        </p:txBody>
+      </p:sp>
+      <p:sp>
+        <p:nvSpPr>
+          <p:cNvPr id="3" name="Rectangle 2"/>
+          <p:cNvSpPr/>
+          <p:nvPr/>
+        </p:nvSpPr>
+        <p:spPr>
+          <a:xfrm>
+            <a:off x="5968401" y="3305890"/>
+            <a:ext cx="255198" cy="246221"/>
+          </a:xfrm>
+          <a:prstGeom prst="rect">
+            <a:avLst/>
+          </a:prstGeom>
+        </p:spPr>
+        <p:txBody>
+          <a:bodyPr wrap="none">
+            <a:spAutoFit/>
+          </a:bodyPr>
+          <a:lstStyle/>
+          <a:p>
+            <a:r>
+              <a:rPr lang="fr-FR" sz="1000" dirty="0">
+                <a:solidFill>
+                  <a:srgbClr val="D9E8F7"/>
+                </a:solidFill>
+                <a:highlight>
+                  <a:srgbClr val="323232"/>
+                </a:highlight>
+                <a:latin typeface="Consolas" panose="020B0609020204030204" pitchFamily="49" charset="0"/>
+              </a:rPr>
+              <a:t> </a:t>
+            </a:r>
+            <a:endParaRPr lang="fr-FR" dirty="0"/>
+          </a:p>
+        </p:txBody>
+      </p:sp>
+    </p:spTree>
+    <p:extLst>
+      <p:ext uri="{BB962C8B-B14F-4D97-AF65-F5344CB8AC3E}">
+        <p14:creationId xmlns:p14="http://schemas.microsoft.com/office/powerpoint/2010/main" val="2584005190"/>
+      </p:ext>
+    </p:extLst>
+  </p:cSld>
+  <p:clrMapOvr>
+    <a:masterClrMapping/>
+  </p:clrMapOvr>
+  <mc:AlternateContent xmlns:mc="http://schemas.openxmlformats.org/markup-compatibility/2006" xmlns:p14="http://schemas.microsoft.com/office/powerpoint/2010/main">
+    <mc:Choice Requires="p14">
       <p:transition spd="slow" p14:dur="2000"/>
     </mc:Choice>
-    <mc:Fallback>
+    <mc:Fallback xmlns="">
       <p:transition spd="slow"/>
     </mc:Fallback>
   </mc:AlternateContent>
@@ -5721,84 +6740,25 @@
             <p:ph type="ctrTitle"/>
           </p:nvPr>
         </p:nvSpPr>
-        <p:spPr/>
-        <p:txBody>
-          <a:bodyPr/>
-          <a:lstStyle/>
-          <a:p>
-            <a:endParaRPr lang="fr-FR" dirty="0"/>
-          </a:p>
-        </p:txBody>
-      </p:sp>
-      <p:sp>
-        <p:nvSpPr>
-          <p:cNvPr id="3" name="Subtitle 2"/>
-          <p:cNvSpPr>
-            <a:spLocks noGrp="1"/>
-          </p:cNvSpPr>
-          <p:nvPr>
-            <p:ph type="subTitle" idx="1"/>
-          </p:nvPr>
-        </p:nvSpPr>
-        <p:spPr/>
-        <p:txBody>
-          <a:bodyPr/>
-          <a:lstStyle/>
-          <a:p>
-            <a:endParaRPr lang="fr-FR" dirty="0"/>
-          </a:p>
-        </p:txBody>
-      </p:sp>
-      <p:sp>
-        <p:nvSpPr>
-          <p:cNvPr id="7" name="Title 1"/>
-          <p:cNvSpPr txBox="1">
-            <a:spLocks/>
-          </p:cNvSpPr>
-          <p:nvPr/>
-        </p:nvSpPr>
-        <p:spPr>
-          <a:xfrm>
-            <a:off x="1221219" y="-1193800"/>
+        <p:spPr>
+          <a:xfrm>
+            <a:off x="1281775" y="-258320"/>
             <a:ext cx="9144000" cy="2387600"/>
           </a:xfrm>
-          <a:prstGeom prst="rect">
-            <a:avLst/>
-          </a:prstGeom>
-        </p:spPr>
-        <p:txBody>
-          <a:bodyPr vert="horz" lIns="91440" tIns="45720" rIns="91440" bIns="45720" rtlCol="0" anchor="b">
-            <a:normAutofit/>
-          </a:bodyPr>
-          <a:lstStyle>
-            <a:lvl1pPr algn="ctr" defTabSz="914400" rtl="0" eaLnBrk="1" latinLnBrk="0" hangingPunct="1">
-              <a:lnSpc>
-                <a:spcPct val="90000"/>
-              </a:lnSpc>
-              <a:spcBef>
-                <a:spcPct val="0"/>
-              </a:spcBef>
-              <a:buNone/>
-              <a:defRPr sz="6000" kern="1200">
-                <a:solidFill>
-                  <a:schemeClr val="tx1"/>
-                </a:solidFill>
-                <a:latin typeface="+mj-lt"/>
-                <a:ea typeface="+mj-ea"/>
-                <a:cs typeface="+mj-cs"/>
-              </a:defRPr>
-            </a:lvl1pPr>
-          </a:lstStyle>
-          <a:p>
-            <a:r>
-              <a:rPr lang="en-US" sz="4000" b="1" dirty="0" smtClean="0">
+        </p:spPr>
+        <p:txBody>
+          <a:bodyPr/>
+          <a:lstStyle/>
+          <a:p>
+            <a:r>
+              <a:rPr lang="en-US" b="1" dirty="0" smtClean="0">
                 <a:solidFill>
                   <a:schemeClr val="bg1"/>
                 </a:solidFill>
               </a:rPr>
-              <a:t>Best optimum sort - Flat</a:t>
-            </a:r>
-            <a:endParaRPr lang="fr-FR" sz="4000" b="1" dirty="0">
+              <a:t>Sorts competition</a:t>
+            </a:r>
+            <a:endParaRPr lang="fr-FR" b="1" dirty="0">
               <a:solidFill>
                 <a:schemeClr val="bg1"/>
               </a:solidFill>
@@ -5806,10 +6766,65 @@
           </a:p>
         </p:txBody>
       </p:sp>
+      <p:sp>
+        <p:nvSpPr>
+          <p:cNvPr id="3" name="Subtitle 2"/>
+          <p:cNvSpPr>
+            <a:spLocks noGrp="1"/>
+          </p:cNvSpPr>
+          <p:nvPr>
+            <p:ph type="subTitle" idx="1"/>
+          </p:nvPr>
+        </p:nvSpPr>
+        <p:spPr/>
+        <p:txBody>
+          <a:bodyPr/>
+          <a:lstStyle/>
+          <a:p>
+            <a:r>
+              <a:rPr lang="en-US" dirty="0" smtClean="0"/>
+              <a:t>BENZA </a:t>
+            </a:r>
+            <a:endParaRPr lang="fr-FR" dirty="0"/>
+          </a:p>
+        </p:txBody>
+      </p:sp>
+      <p:sp>
+        <p:nvSpPr>
+          <p:cNvPr id="5" name="Rectangle 4"/>
+          <p:cNvSpPr/>
+          <p:nvPr/>
+        </p:nvSpPr>
+        <p:spPr>
+          <a:xfrm>
+            <a:off x="3931113" y="2070323"/>
+            <a:ext cx="6096000" cy="369332"/>
+          </a:xfrm>
+          <a:prstGeom prst="rect">
+            <a:avLst/>
+          </a:prstGeom>
+        </p:spPr>
+        <p:txBody>
+          <a:bodyPr>
+            <a:spAutoFit/>
+          </a:bodyPr>
+          <a:lstStyle/>
+          <a:p>
+            <a:r>
+              <a:rPr lang="en-US" dirty="0" smtClean="0">
+                <a:solidFill>
+                  <a:schemeClr val="bg1"/>
+                </a:solidFill>
+              </a:rPr>
+              <a:t>BENZA Amandine – FORNALI Damien</a:t>
+            </a:r>
+          </a:p>
+        </p:txBody>
+      </p:sp>
     </p:spTree>
     <p:extLst>
       <p:ext uri="{BB962C8B-B14F-4D97-AF65-F5344CB8AC3E}">
-        <p14:creationId xmlns:p14="http://schemas.microsoft.com/office/powerpoint/2010/main" val="169951126"/>
+        <p14:creationId xmlns:p14="http://schemas.microsoft.com/office/powerpoint/2010/main" val="3943499016"/>
       </p:ext>
     </p:extLst>
   </p:cSld>
@@ -5843,16 +6858,37 @@
           <a:chExt cx="0" cy="0"/>
         </a:xfrm>
       </p:grpSpPr>
+      <p:sp>
+        <p:nvSpPr>
+          <p:cNvPr id="2" name="Title 1"/>
+          <p:cNvSpPr>
+            <a:spLocks noGrp="1"/>
+          </p:cNvSpPr>
+          <p:nvPr>
+            <p:ph type="title"/>
+          </p:nvPr>
+        </p:nvSpPr>
+        <p:spPr/>
+        <p:txBody>
+          <a:bodyPr/>
+          <a:lstStyle/>
+          <a:p>
+            <a:endParaRPr lang="fr-FR"/>
+          </a:p>
+        </p:txBody>
+      </p:sp>
       <p:pic>
         <p:nvPicPr>
-          <p:cNvPr id="4" name="Picture 3"/>
+          <p:cNvPr id="4" name="Content Placeholder 3"/>
           <p:cNvPicPr>
-            <a:picLocks noChangeAspect="1"/>
+            <a:picLocks noGrp="1" noChangeAspect="1"/>
           </p:cNvPicPr>
-          <p:nvPr/>
+          <p:nvPr>
+            <p:ph idx="1"/>
+          </p:nvPr>
         </p:nvPicPr>
         <p:blipFill>
-          <a:blip r:embed="rId2">
+          <a:blip r:embed="rId2" cstate="print">
             <a:extLst>
               <a:ext uri="{28A0092B-C50C-407E-A947-70E740481C1C}">
                 <a14:useLocalDpi xmlns:a14="http://schemas.microsoft.com/office/drawing/2010/main" val="0"/>
@@ -5868,110 +6904,52 @@
             <a:off x="0" y="0"/>
             <a:ext cx="12192000" cy="6858000"/>
           </a:xfrm>
+        </p:spPr>
+      </p:pic>
+      <p:pic>
+        <p:nvPicPr>
+          <p:cNvPr id="5" name="Picture 4"/>
+          <p:cNvPicPr>
+            <a:picLocks noChangeAspect="1"/>
+          </p:cNvPicPr>
+          <p:nvPr/>
+        </p:nvPicPr>
+        <p:blipFill>
+          <a:blip r:embed="rId3" cstate="print">
+            <a:extLst>
+              <a:ext uri="{28A0092B-C50C-407E-A947-70E740481C1C}">
+                <a14:useLocalDpi xmlns:a14="http://schemas.microsoft.com/office/drawing/2010/main" val="0"/>
+              </a:ext>
+            </a:extLst>
+          </a:blip>
+          <a:stretch>
+            <a:fillRect/>
+          </a:stretch>
+        </p:blipFill>
+        <p:spPr>
+          <a:xfrm>
+            <a:off x="993123" y="973405"/>
+            <a:ext cx="9963528" cy="5307127"/>
+          </a:xfrm>
           <a:prstGeom prst="rect">
             <a:avLst/>
           </a:prstGeom>
+          <a:ln>
+            <a:noFill/>
+          </a:ln>
+          <a:effectLst>
+            <a:outerShdw blurRad="292100" dist="139700" dir="2700000" algn="tl" rotWithShape="0">
+              <a:srgbClr val="333333">
+                <a:alpha val="65000"/>
+              </a:srgbClr>
+            </a:outerShdw>
+          </a:effectLst>
         </p:spPr>
       </p:pic>
-      <p:sp>
-        <p:nvSpPr>
-          <p:cNvPr id="2" name="Title 1"/>
-          <p:cNvSpPr>
-            <a:spLocks noGrp="1"/>
-          </p:cNvSpPr>
-          <p:nvPr>
-            <p:ph type="ctrTitle"/>
-          </p:nvPr>
-        </p:nvSpPr>
-        <p:spPr/>
-        <p:txBody>
-          <a:bodyPr/>
-          <a:lstStyle/>
-          <a:p>
-            <a:endParaRPr lang="fr-FR" dirty="0"/>
-          </a:p>
-        </p:txBody>
-      </p:sp>
-      <p:sp>
-        <p:nvSpPr>
-          <p:cNvPr id="3" name="Subtitle 2"/>
-          <p:cNvSpPr>
-            <a:spLocks noGrp="1"/>
-          </p:cNvSpPr>
-          <p:nvPr>
-            <p:ph type="subTitle" idx="1"/>
-          </p:nvPr>
-        </p:nvSpPr>
-        <p:spPr/>
-        <p:txBody>
-          <a:bodyPr/>
-          <a:lstStyle/>
-          <a:p>
-            <a:endParaRPr lang="fr-FR" dirty="0"/>
-          </a:p>
-        </p:txBody>
-      </p:sp>
-      <p:sp>
-        <p:nvSpPr>
-          <p:cNvPr id="7" name="Title 1"/>
-          <p:cNvSpPr txBox="1">
-            <a:spLocks/>
-          </p:cNvSpPr>
-          <p:nvPr/>
-        </p:nvSpPr>
-        <p:spPr>
-          <a:xfrm>
-            <a:off x="1221219" y="-1193800"/>
-            <a:ext cx="9144000" cy="2387600"/>
-          </a:xfrm>
-          <a:prstGeom prst="rect">
-            <a:avLst/>
-          </a:prstGeom>
-        </p:spPr>
-        <p:txBody>
-          <a:bodyPr vert="horz" lIns="91440" tIns="45720" rIns="91440" bIns="45720" rtlCol="0" anchor="b">
-            <a:normAutofit/>
-          </a:bodyPr>
-          <a:lstStyle>
-            <a:lvl1pPr algn="ctr" defTabSz="914400" rtl="0" eaLnBrk="1" latinLnBrk="0" hangingPunct="1">
-              <a:lnSpc>
-                <a:spcPct val="90000"/>
-              </a:lnSpc>
-              <a:spcBef>
-                <a:spcPct val="0"/>
-              </a:spcBef>
-              <a:buNone/>
-              <a:defRPr sz="6000" kern="1200">
-                <a:solidFill>
-                  <a:schemeClr val="tx1"/>
-                </a:solidFill>
-                <a:latin typeface="+mj-lt"/>
-                <a:ea typeface="+mj-ea"/>
-                <a:cs typeface="+mj-cs"/>
-              </a:defRPr>
-            </a:lvl1pPr>
-          </a:lstStyle>
-          <a:p>
-            <a:r>
-              <a:rPr lang="en-US" sz="4000" b="1" dirty="0" smtClean="0">
-                <a:solidFill>
-                  <a:schemeClr val="bg1"/>
-                </a:solidFill>
-              </a:rPr>
-              <a:t>Best optimum sort - Sorted</a:t>
-            </a:r>
-            <a:endParaRPr lang="fr-FR" sz="4000" b="1" dirty="0">
-              <a:solidFill>
-                <a:schemeClr val="bg1"/>
-              </a:solidFill>
-            </a:endParaRPr>
-          </a:p>
-        </p:txBody>
-      </p:sp>
     </p:spTree>
     <p:extLst>
       <p:ext uri="{BB962C8B-B14F-4D97-AF65-F5344CB8AC3E}">
-        <p14:creationId xmlns:p14="http://schemas.microsoft.com/office/powerpoint/2010/main" val="2903659727"/>
+        <p14:creationId xmlns:p14="http://schemas.microsoft.com/office/powerpoint/2010/main" val="739320289"/>
       </p:ext>
     </p:extLst>
   </p:cSld>

</xml_diff>